<commit_message>
powerpoint on android device benchmark
</commit_message>
<xml_diff>
--- a/benchmark.pptx
+++ b/benchmark.pptx
@@ -730,6 +730,90 @@
 </file>
 
 <file path=ppt/notesSlides/notesSlide2.xml><?xml version="1.0" encoding="utf-8"?>
+<p:notes xmlns:a="http://schemas.openxmlformats.org/drawingml/2006/main" xmlns:r="http://schemas.openxmlformats.org/officeDocument/2006/relationships" xmlns:p="http://schemas.openxmlformats.org/presentationml/2006/main">
+  <p:cSld>
+    <p:spTree>
+      <p:nvGrpSpPr>
+        <p:cNvPr id="1" name=""/>
+        <p:cNvGrpSpPr/>
+        <p:nvPr/>
+      </p:nvGrpSpPr>
+      <p:grpSpPr>
+        <a:xfrm>
+          <a:off x="0" y="0"/>
+          <a:ext cx="0" cy="0"/>
+          <a:chOff x="0" y="0"/>
+          <a:chExt cx="0" cy="0"/>
+        </a:xfrm>
+      </p:grpSpPr>
+      <p:sp>
+        <p:nvSpPr>
+          <p:cNvPr id="2" name="Slide Image Placeholder 1"/>
+          <p:cNvSpPr>
+            <a:spLocks noGrp="1" noRot="1" noChangeAspect="1"/>
+          </p:cNvSpPr>
+          <p:nvPr>
+            <p:ph type="sldImg"/>
+          </p:nvPr>
+        </p:nvSpPr>
+        <p:spPr/>
+      </p:sp>
+      <p:sp>
+        <p:nvSpPr>
+          <p:cNvPr id="3" name="Notes Placeholder 2"/>
+          <p:cNvSpPr>
+            <a:spLocks noGrp="1"/>
+          </p:cNvSpPr>
+          <p:nvPr>
+            <p:ph type="body" idx="1"/>
+          </p:nvPr>
+        </p:nvSpPr>
+        <p:spPr/>
+        <p:txBody>
+          <a:bodyPr/>
+          <a:lstStyle/>
+          <a:p>
+            <a:endParaRPr lang="en-US" dirty="0"/>
+          </a:p>
+        </p:txBody>
+      </p:sp>
+      <p:sp>
+        <p:nvSpPr>
+          <p:cNvPr id="4" name="Slide Number Placeholder 3"/>
+          <p:cNvSpPr>
+            <a:spLocks noGrp="1"/>
+          </p:cNvSpPr>
+          <p:nvPr>
+            <p:ph type="sldNum" sz="quarter" idx="10"/>
+          </p:nvPr>
+        </p:nvSpPr>
+        <p:spPr/>
+        <p:txBody>
+          <a:bodyPr/>
+          <a:lstStyle/>
+          <a:p>
+            <a:fld id="{B63DC3D0-48AD-48F3-8595-473248E95381}" type="slidenum">
+              <a:rPr lang="en-US" smtClean="0"/>
+              <a:t>7</a:t>
+            </a:fld>
+            <a:endParaRPr lang="en-US"/>
+          </a:p>
+        </p:txBody>
+      </p:sp>
+    </p:spTree>
+    <p:extLst>
+      <p:ext uri="{BB962C8B-B14F-4D97-AF65-F5344CB8AC3E}">
+        <p14:creationId xmlns:p14="http://schemas.microsoft.com/office/powerpoint/2010/main" val="3704116498"/>
+      </p:ext>
+    </p:extLst>
+  </p:cSld>
+  <p:clrMapOvr>
+    <a:masterClrMapping/>
+  </p:clrMapOvr>
+</p:notes>
+</file>
+
+<file path=ppt/notesSlides/notesSlide3.xml><?xml version="1.0" encoding="utf-8"?>
 <p:notes xmlns:a="http://schemas.openxmlformats.org/drawingml/2006/main" xmlns:r="http://schemas.openxmlformats.org/officeDocument/2006/relationships" xmlns:p="http://schemas.openxmlformats.org/presentationml/2006/main">
   <p:cSld>
     <p:spTree>
@@ -6834,11 +6918,7 @@
             </a:r>
             <a:r>
               <a:rPr lang="en-US" b="1" u="sng" dirty="0" smtClean="0"/>
-              <a:t>ndroid devices </a:t>
-            </a:r>
-            <a:r>
-              <a:rPr lang="en-US" b="1" u="sng" dirty="0" smtClean="0"/>
-              <a:t>benchmark</a:t>
+              <a:t>ndroid devices benchmark</a:t>
             </a:r>
             <a:endParaRPr lang="en-US" dirty="0"/>
           </a:p>
@@ -6881,21 +6961,8 @@
                   <a:schemeClr val="tx1"/>
                 </a:solidFill>
               </a:rPr>
-              <a:t> Yee, </a:t>
-            </a:r>
-            <a:r>
-              <a:rPr lang="en-US" sz="1800" dirty="0" smtClean="0">
-                <a:solidFill>
-                  <a:schemeClr val="tx1"/>
-                </a:solidFill>
-              </a:rPr>
-              <a:t>Kelly</a:t>
-            </a:r>
-            <a:endParaRPr lang="en-US" sz="1800" dirty="0" smtClean="0">
-              <a:solidFill>
-                <a:schemeClr val="tx1"/>
-              </a:solidFill>
-            </a:endParaRPr>
+              <a:t> Yee, Kelly</a:t>
+            </a:r>
           </a:p>
         </p:txBody>
       </p:sp>
@@ -7025,11 +7092,7 @@
           <a:p>
             <a:r>
               <a:rPr lang="en-US" dirty="0" smtClean="0"/>
-              <a:t>Only full benchmark test is </a:t>
-            </a:r>
-            <a:r>
-              <a:rPr lang="en-US" dirty="0" smtClean="0"/>
-              <a:t>available</a:t>
+              <a:t>Only full benchmark test is available</a:t>
             </a:r>
           </a:p>
           <a:p>
@@ -7259,7 +7322,7 @@
         <p:spPr/>
         <p:txBody>
           <a:bodyPr>
-            <a:normAutofit fontScale="92500" lnSpcReduction="10000"/>
+            <a:normAutofit fontScale="92500" lnSpcReduction="20000"/>
           </a:bodyPr>
           <a:lstStyle/>
           <a:p>
@@ -7277,19 +7340,7 @@
           <a:p>
             <a:r>
               <a:rPr lang="en-US" dirty="0" smtClean="0"/>
-              <a:t>Result presented in </a:t>
-            </a:r>
-            <a:r>
-              <a:rPr lang="en-US" dirty="0" smtClean="0"/>
-              <a:t>millions </a:t>
-            </a:r>
-            <a:r>
-              <a:rPr lang="en-US" dirty="0" smtClean="0"/>
-              <a:t>of floating point operations per </a:t>
-            </a:r>
-            <a:r>
-              <a:rPr lang="en-US" dirty="0" smtClean="0"/>
-              <a:t>second</a:t>
+              <a:t>Result presented in millions of floating point operations per second</a:t>
             </a:r>
           </a:p>
           <a:p>
@@ -7317,11 +7368,11 @@
               <a:t>done by </a:t>
             </a:r>
             <a:r>
-              <a:rPr lang="en-US" dirty="0" err="1"/>
-              <a:t>Antutu</a:t>
-            </a:r>
-            <a:r>
-              <a:rPr lang="en-US" dirty="0"/>
+              <a:rPr lang="en-US" dirty="0" err="1" smtClean="0"/>
+              <a:t>AnTuTu</a:t>
+            </a:r>
+            <a:r>
+              <a:rPr lang="en-US" dirty="0" smtClean="0"/>
               <a:t> </a:t>
             </a:r>
             <a:r>
@@ -7498,11 +7549,7 @@
           <a:p>
             <a:r>
               <a:rPr lang="en-US" dirty="0" smtClean="0"/>
-              <a:t>Simple test on the speed of </a:t>
-            </a:r>
-            <a:r>
-              <a:rPr lang="en-US" dirty="0" smtClean="0"/>
-              <a:t>CPU</a:t>
+              <a:t>Simple test on the speed of CPU</a:t>
             </a:r>
           </a:p>
           <a:p>
@@ -7526,11 +7573,11 @@
               <a:t>done by </a:t>
             </a:r>
             <a:r>
-              <a:rPr lang="en-US" dirty="0" err="1"/>
-              <a:t>Antutu</a:t>
-            </a:r>
-            <a:r>
-              <a:rPr lang="en-US" dirty="0"/>
+              <a:rPr lang="en-US" dirty="0" err="1" smtClean="0"/>
+              <a:t>AnTuTu</a:t>
+            </a:r>
+            <a:r>
+              <a:rPr lang="en-US" dirty="0" smtClean="0"/>
               <a:t> </a:t>
             </a:r>
             <a:r>
@@ -7948,35 +7995,19 @@
           <a:p>
             <a:r>
               <a:rPr lang="en-US" sz="8800" dirty="0"/>
-              <a:t>measures performance using realistic scenes that could be taken from a typical </a:t>
-            </a:r>
+              <a:t>measures performance using realistic scenes that could be taken from a typical game</a:t>
+            </a:r>
+          </a:p>
+          <a:p>
             <a:r>
               <a:rPr lang="en-US" sz="8800" dirty="0"/>
-              <a:t>game</a:t>
+              <a:t>result presented in frames per second</a:t>
             </a:r>
           </a:p>
           <a:p>
             <a:r>
               <a:rPr lang="en-US" sz="8800" dirty="0"/>
-              <a:t>result presented in </a:t>
-            </a:r>
-            <a:r>
-              <a:rPr lang="en-US" sz="8800" dirty="0"/>
-              <a:t>frames per </a:t>
-            </a:r>
-            <a:r>
-              <a:rPr lang="en-US" sz="8800" dirty="0"/>
-              <a:t>second</a:t>
-            </a:r>
-          </a:p>
-          <a:p>
-            <a:r>
-              <a:rPr lang="en-US" sz="8800" dirty="0"/>
-              <a:t>Reason for not </a:t>
-            </a:r>
-            <a:r>
-              <a:rPr lang="en-US" sz="8800" dirty="0"/>
-              <a:t>choosing:</a:t>
+              <a:t>Reason for not choosing:</a:t>
             </a:r>
           </a:p>
           <a:p>
@@ -7986,12 +8017,16 @@
               <a:t>Graphics performance are being tested by </a:t>
             </a:r>
             <a:r>
-              <a:rPr lang="en-US" sz="7200" dirty="0" err="1"/>
-              <a:t>Antutu</a:t>
+              <a:rPr lang="en-US" sz="7200" dirty="0" err="1" smtClean="0"/>
+              <a:t>AnTuTu</a:t>
+            </a:r>
+            <a:r>
+              <a:rPr lang="en-US" sz="7200" dirty="0" smtClean="0"/>
+              <a:t> </a:t>
             </a:r>
             <a:r>
               <a:rPr lang="en-US" sz="7200" dirty="0"/>
-              <a:t> Benchmark </a:t>
+              <a:t>Benchmark </a:t>
             </a:r>
           </a:p>
           <a:p>
@@ -8198,12 +8233,16 @@
               <a:t>Graphics performance are being tested by </a:t>
             </a:r>
             <a:r>
-              <a:rPr lang="en-US" dirty="0" err="1"/>
-              <a:t>Antutu</a:t>
+              <a:rPr lang="en-US" dirty="0" err="1" smtClean="0"/>
+              <a:t>AnTuTu</a:t>
+            </a:r>
+            <a:r>
+              <a:rPr lang="en-US" dirty="0" smtClean="0"/>
+              <a:t> </a:t>
             </a:r>
             <a:r>
               <a:rPr lang="en-US" dirty="0"/>
-              <a:t> Benchmark </a:t>
+              <a:t>Benchmark </a:t>
             </a:r>
           </a:p>
           <a:p>
@@ -8383,11 +8422,15 @@
             </a:r>
             <a:r>
               <a:rPr lang="en-US" sz="2600" b="1" dirty="0" err="1" smtClean="0"/>
-              <a:t>Antutu</a:t>
+              <a:t>AnTuTu</a:t>
             </a:r>
             <a:r>
               <a:rPr lang="en-US" sz="2600" b="1" dirty="0" smtClean="0"/>
-              <a:t> Benchmark * 80 %  +     </a:t>
+              <a:t> </a:t>
+            </a:r>
+            <a:r>
+              <a:rPr lang="en-US" sz="2600" b="1" dirty="0" smtClean="0"/>
+              <a:t>Benchmark * 80 %  +     </a:t>
             </a:r>
           </a:p>
           <a:p>
@@ -8435,11 +8478,7 @@
             </a:r>
             <a:r>
               <a:rPr lang="en-US" sz="2200" dirty="0" smtClean="0"/>
-              <a:t> score is used as an additional information for ranking when the overall scores of two devices are close to each other</a:t>
-            </a:r>
-            <a:r>
-              <a:rPr lang="en-US" sz="2200" dirty="0" smtClean="0"/>
-              <a:t>)</a:t>
+              <a:t> score is used as an additional information for ranking when the overall scores of two devices are close to each other)</a:t>
             </a:r>
             <a:endParaRPr lang="en-US" sz="2200" dirty="0"/>
           </a:p>
@@ -10570,13 +10609,14 @@
             </a:r>
             <a:r>
               <a:rPr lang="en-US" sz="2400" dirty="0" smtClean="0"/>
-              <a:t> Benchmark allows both full benchmark test and custom benchmark test, that is user can choose to test on certain parts of the device</a:t>
-            </a:r>
-          </a:p>
-          <a:p>
-            <a:pPr marL="0" indent="0">
-              <a:buNone/>
-            </a:pPr>
+              <a:t> Benchmark allows both full benchmark test and custom benchmark test, that is user can choose to test on certain parts of the </a:t>
+            </a:r>
+            <a:r>
+              <a:rPr lang="en-US" sz="2400" dirty="0" smtClean="0"/>
+              <a:t>device. </a:t>
+            </a:r>
+          </a:p>
+          <a:p>
             <a:endParaRPr lang="en-US" sz="2400" dirty="0" smtClean="0"/>
           </a:p>
           <a:p>
@@ -10722,15 +10762,12 @@
         </p:spPr>
         <p:txBody>
           <a:bodyPr>
-            <a:normAutofit/>
+            <a:normAutofit lnSpcReduction="10000"/>
           </a:bodyPr>
           <a:lstStyle/>
           <a:p>
-            <a:pPr marL="0" indent="0">
-              <a:buNone/>
-            </a:pPr>
-            <a:r>
-              <a:rPr lang="en-US" sz="2000" dirty="0" smtClean="0"/>
+            <a:r>
+              <a:rPr lang="en-US" sz="2000" dirty="0"/>
               <a:t>Measures </a:t>
             </a:r>
             <a:r>
@@ -10739,90 +10776,112 @@
             </a:r>
           </a:p>
           <a:p>
+            <a:pPr lvl="1"/>
+            <a:r>
+              <a:rPr lang="en-US" sz="1600" dirty="0"/>
+              <a:t>the browser’s use of the HTML5 display processing subsystem</a:t>
+            </a:r>
+          </a:p>
+          <a:p>
+            <a:pPr lvl="1"/>
+            <a:r>
+              <a:rPr lang="en-US" sz="1600" dirty="0"/>
+              <a:t>overall speed and efficiency of the JavaScript virtual machine</a:t>
+            </a:r>
+          </a:p>
+          <a:p>
+            <a:pPr lvl="1"/>
+            <a:r>
+              <a:rPr lang="en-US" sz="1600" dirty="0"/>
+              <a:t>the efficiency between this engine and the core browser</a:t>
+            </a:r>
+          </a:p>
+          <a:p>
+            <a:pPr lvl="1"/>
+            <a:r>
+              <a:rPr lang="en-US" sz="1600" dirty="0"/>
+              <a:t>responsiveness of panning, zooming, and scrolling of text, images, and standard web page objects</a:t>
+            </a:r>
+          </a:p>
+          <a:p>
+            <a:pPr lvl="1"/>
+            <a:r>
+              <a:rPr lang="en-US" sz="1600" dirty="0"/>
+              <a:t>the performance of the browser’s HTTP and IP networking </a:t>
+            </a:r>
+            <a:r>
+              <a:rPr lang="en-US" sz="1600" dirty="0" smtClean="0"/>
+              <a:t>stack</a:t>
+            </a:r>
+          </a:p>
+          <a:p>
+            <a:pPr marL="342900" lvl="1" indent="-342900">
+              <a:buFont typeface="Arial" pitchFamily="34" charset="0"/>
+              <a:buChar char="•"/>
+            </a:pPr>
             <a:r>
               <a:rPr lang="en-US" sz="2000" dirty="0"/>
-              <a:t>the browser’s use of the HTML5 display processing subsystem</a:t>
-            </a:r>
-          </a:p>
-          <a:p>
+              <a:t>Can be used to benchmark different android device if the same browser is being used on </a:t>
+            </a:r>
+            <a:r>
+              <a:rPr lang="en-US" sz="2000" dirty="0" smtClean="0"/>
+              <a:t>each</a:t>
+            </a:r>
+            <a:endParaRPr lang="en-US" sz="1800" dirty="0" smtClean="0"/>
+          </a:p>
+          <a:p>
+            <a:pPr marL="342900" lvl="1" indent="-342900">
+              <a:buFont typeface="Arial" pitchFamily="34" charset="0"/>
+              <a:buChar char="•"/>
+            </a:pPr>
             <a:r>
               <a:rPr lang="en-US" sz="2000" dirty="0"/>
-              <a:t>overall speed and efficiency of the JavaScript virtual machine</a:t>
-            </a:r>
-          </a:p>
-          <a:p>
-            <a:r>
-              <a:rPr lang="en-US" sz="2000" dirty="0"/>
-              <a:t>the efficiency between this engine and the core browser</a:t>
-            </a:r>
-          </a:p>
-          <a:p>
-            <a:r>
-              <a:rPr lang="en-US" sz="2000" dirty="0"/>
-              <a:t>responsiveness of panning, zooming, and scrolling of text, images, and standard web page objects</a:t>
-            </a:r>
-          </a:p>
-          <a:p>
-            <a:r>
-              <a:rPr lang="en-US" sz="2000" dirty="0"/>
-              <a:t>the performance of the browser’s HTTP and IP networking </a:t>
+              <a:t>Reasons for choosing this </a:t>
             </a:r>
             <a:r>
               <a:rPr lang="en-US" sz="2000" dirty="0" smtClean="0"/>
-              <a:t>stack</a:t>
-            </a:r>
-            <a:endParaRPr lang="en-US" sz="1800" dirty="0" smtClean="0"/>
-          </a:p>
-          <a:p>
-            <a:pPr marL="0" indent="0">
+              <a:t>application instead of other browser benchmark:</a:t>
+            </a:r>
+            <a:endParaRPr lang="en-US" sz="2000" dirty="0"/>
+          </a:p>
+          <a:p>
+            <a:pPr lvl="1"/>
+            <a:r>
+              <a:rPr lang="en-US" sz="1600" dirty="0"/>
+              <a:t>High user rating </a:t>
+            </a:r>
+            <a:r>
+              <a:rPr lang="en-US" sz="1600" dirty="0" smtClean="0"/>
+              <a:t>in </a:t>
+            </a:r>
+            <a:r>
+              <a:rPr lang="en-US" sz="1600" dirty="0" err="1" smtClean="0"/>
+              <a:t>google</a:t>
+            </a:r>
+            <a:r>
+              <a:rPr lang="en-US" sz="1600" dirty="0" smtClean="0"/>
+              <a:t> </a:t>
+            </a:r>
+            <a:r>
+              <a:rPr lang="en-US" sz="1600" dirty="0"/>
+              <a:t>play </a:t>
+            </a:r>
+            <a:r>
+              <a:rPr lang="en-US" sz="1600" dirty="0" smtClean="0"/>
+              <a:t>store </a:t>
+            </a:r>
+          </a:p>
+          <a:p>
+            <a:pPr marL="400050" lvl="1" indent="0">
               <a:buNone/>
             </a:pPr>
             <a:r>
-              <a:rPr lang="en-US" sz="2000" dirty="0" smtClean="0"/>
-              <a:t>Reasons for choosing this application:</a:t>
-            </a:r>
-          </a:p>
-          <a:p>
-            <a:r>
-              <a:rPr lang="en-US" sz="2000" dirty="0"/>
-              <a:t>High user rating </a:t>
-            </a:r>
-            <a:r>
-              <a:rPr lang="en-US" sz="2000" dirty="0" smtClean="0"/>
-              <a:t>in </a:t>
-            </a:r>
-            <a:r>
-              <a:rPr lang="en-US" sz="2000" dirty="0" err="1" smtClean="0"/>
-              <a:t>google</a:t>
-            </a:r>
-            <a:r>
-              <a:rPr lang="en-US" sz="2000" dirty="0" smtClean="0"/>
+              <a:rPr lang="en-US" sz="1600" dirty="0"/>
               <a:t> </a:t>
             </a:r>
             <a:r>
-              <a:rPr lang="en-US" sz="2000" dirty="0"/>
-              <a:t>play </a:t>
-            </a:r>
-            <a:r>
-              <a:rPr lang="en-US" sz="2000" dirty="0" smtClean="0"/>
-              <a:t>store </a:t>
-            </a:r>
-          </a:p>
-          <a:p>
-            <a:pPr marL="0" indent="0">
-              <a:buNone/>
-            </a:pPr>
-            <a:r>
-              <a:rPr lang="en-US" sz="2000" dirty="0"/>
-              <a:t> </a:t>
-            </a:r>
-            <a:r>
-              <a:rPr lang="en-US" sz="2000" dirty="0" smtClean="0"/>
-              <a:t>      </a:t>
-            </a:r>
-            <a:r>
-              <a:rPr lang="en-US" sz="1600" dirty="0" smtClean="0"/>
-              <a:t>(average rating : 4.3 / 5)</a:t>
+              <a:rPr lang="en-US" sz="1200" dirty="0" smtClean="0"/>
+              <a:t>      (average rating : 4.3 / 5)</a:t>
             </a:r>
           </a:p>
         </p:txBody>
@@ -10836,7 +10895,7 @@
           <p:nvPr/>
         </p:nvPicPr>
         <p:blipFill>
-          <a:blip r:embed="rId2">
+          <a:blip r:embed="rId3">
             <a:extLst>
               <a:ext uri="{28A0092B-C50C-407E-A947-70E740481C1C}">
                 <a14:useLocalDpi xmlns:a14="http://schemas.microsoft.com/office/drawing/2010/main" val="0"/>
@@ -10866,7 +10925,7 @@
           <p:nvPr/>
         </p:nvPicPr>
         <p:blipFill>
-          <a:blip r:embed="rId3">
+          <a:blip r:embed="rId4">
             <a:extLst>
               <a:ext uri="{28A0092B-C50C-407E-A947-70E740481C1C}">
                 <a14:useLocalDpi xmlns:a14="http://schemas.microsoft.com/office/drawing/2010/main" val="0"/>
@@ -11008,11 +11067,7 @@
             </a:r>
             <a:r>
               <a:rPr lang="en-US" dirty="0"/>
-              <a:t>(33 different tests</a:t>
-            </a:r>
-            <a:r>
-              <a:rPr lang="en-US" dirty="0"/>
-              <a:t>)</a:t>
+              <a:t>(33 different tests)</a:t>
             </a:r>
           </a:p>
           <a:p>
@@ -11267,23 +11322,19 @@
             <a:pPr lvl="1"/>
             <a:r>
               <a:rPr lang="en-US" dirty="0" smtClean="0"/>
-              <a:t>Tests on SD writing and reading are already included in the </a:t>
+              <a:t>Tests on SD writing and reading are already included in the testing done by </a:t>
+            </a:r>
+            <a:r>
+              <a:rPr lang="en-US" dirty="0" err="1" smtClean="0"/>
+              <a:t>AnTuTu</a:t>
             </a:r>
             <a:r>
               <a:rPr lang="en-US" dirty="0" smtClean="0"/>
-              <a:t>testing </a:t>
+              <a:t> </a:t>
             </a:r>
             <a:r>
               <a:rPr lang="en-US" dirty="0" smtClean="0"/>
-              <a:t>done by </a:t>
-            </a:r>
-            <a:r>
-              <a:rPr lang="en-US" dirty="0" err="1" smtClean="0"/>
-              <a:t>Antutu</a:t>
-            </a:r>
-            <a:r>
-              <a:rPr lang="en-US" dirty="0" smtClean="0"/>
-              <a:t> Benchmark </a:t>
+              <a:t>Benchmark </a:t>
             </a:r>
             <a:endParaRPr lang="en-US" dirty="0"/>
           </a:p>

</xml_diff>

<commit_message>
changed titles of slides
</commit_message>
<xml_diff>
--- a/benchmark.pptx
+++ b/benchmark.pptx
@@ -6,29 +6,30 @@
     <p:sldMasterId id="2147483660" r:id="rId2"/>
   </p:sldMasterIdLst>
   <p:notesMasterIdLst>
-    <p:notesMasterId r:id="rId20"/>
+    <p:notesMasterId r:id="rId21"/>
   </p:notesMasterIdLst>
   <p:handoutMasterIdLst>
-    <p:handoutMasterId r:id="rId21"/>
+    <p:handoutMasterId r:id="rId22"/>
   </p:handoutMasterIdLst>
   <p:sldIdLst>
     <p:sldId id="256" r:id="rId3"/>
     <p:sldId id="257" r:id="rId4"/>
     <p:sldId id="273" r:id="rId5"/>
     <p:sldId id="258" r:id="rId6"/>
-    <p:sldId id="265" r:id="rId7"/>
-    <p:sldId id="263" r:id="rId8"/>
-    <p:sldId id="259" r:id="rId9"/>
-    <p:sldId id="260" r:id="rId10"/>
-    <p:sldId id="266" r:id="rId11"/>
-    <p:sldId id="268" r:id="rId12"/>
-    <p:sldId id="269" r:id="rId13"/>
-    <p:sldId id="270" r:id="rId14"/>
-    <p:sldId id="271" r:id="rId15"/>
-    <p:sldId id="267" r:id="rId16"/>
-    <p:sldId id="272" r:id="rId17"/>
-    <p:sldId id="261" r:id="rId18"/>
-    <p:sldId id="264" r:id="rId19"/>
+    <p:sldId id="263" r:id="rId7"/>
+    <p:sldId id="259" r:id="rId8"/>
+    <p:sldId id="260" r:id="rId9"/>
+    <p:sldId id="261" r:id="rId10"/>
+    <p:sldId id="264" r:id="rId11"/>
+    <p:sldId id="275" r:id="rId12"/>
+    <p:sldId id="265" r:id="rId13"/>
+    <p:sldId id="266" r:id="rId14"/>
+    <p:sldId id="268" r:id="rId15"/>
+    <p:sldId id="269" r:id="rId16"/>
+    <p:sldId id="270" r:id="rId17"/>
+    <p:sldId id="271" r:id="rId18"/>
+    <p:sldId id="267" r:id="rId19"/>
+    <p:sldId id="272" r:id="rId20"/>
   </p:sldIdLst>
   <p:sldSz cx="9144000" cy="6858000" type="screen4x3"/>
   <p:notesSz cx="6858000" cy="9144000"/>
@@ -212,7 +213,7 @@
           <a:p>
             <a:fld id="{CCE33303-72BA-4FB2-B2EF-C4C02F7F8703}" type="datetimeFigureOut">
               <a:rPr lang="en-US" smtClean="0"/>
-              <a:t>6/29/2012</a:t>
+              <a:t>7/4/2012</a:t>
             </a:fld>
             <a:endParaRPr lang="en-US"/>
           </a:p>
@@ -377,7 +378,7 @@
           <a:p>
             <a:fld id="{A1E62AE7-B727-4968-8D78-71B0188CF367}" type="datetimeFigureOut">
               <a:rPr lang="en-US" smtClean="0"/>
-              <a:t>6/29/2012</a:t>
+              <a:t>7/4/2012</a:t>
             </a:fld>
             <a:endParaRPr lang="en-US"/>
           </a:p>
@@ -794,7 +795,7 @@
           <a:p>
             <a:fld id="{B63DC3D0-48AD-48F3-8595-473248E95381}" type="slidenum">
               <a:rPr lang="en-US" smtClean="0"/>
-              <a:t>7</a:t>
+              <a:t>6</a:t>
             </a:fld>
             <a:endParaRPr lang="en-US"/>
           </a:p>
@@ -878,7 +879,7 @@
           <a:p>
             <a:fld id="{B63DC3D0-48AD-48F3-8595-473248E95381}" type="slidenum">
               <a:rPr lang="en-US" smtClean="0"/>
-              <a:t>11</a:t>
+              <a:t>14</a:t>
             </a:fld>
             <a:endParaRPr lang="en-US"/>
           </a:p>
@@ -1078,7 +1079,7 @@
           <a:p>
             <a:fld id="{6A814141-4123-430A-9D32-7C9F93C128E8}" type="datetimeFigureOut">
               <a:rPr lang="en-US" smtClean="0"/>
-              <a:t>6/29/2012</a:t>
+              <a:t>7/4/2012</a:t>
             </a:fld>
             <a:endParaRPr lang="en-US"/>
           </a:p>
@@ -1255,7 +1256,7 @@
           <a:p>
             <a:fld id="{6A814141-4123-430A-9D32-7C9F93C128E8}" type="datetimeFigureOut">
               <a:rPr lang="en-US" smtClean="0"/>
-              <a:t>6/29/2012</a:t>
+              <a:t>7/4/2012</a:t>
             </a:fld>
             <a:endParaRPr lang="en-US"/>
           </a:p>
@@ -1435,7 +1436,7 @@
           <a:p>
             <a:fld id="{6A814141-4123-430A-9D32-7C9F93C128E8}" type="datetimeFigureOut">
               <a:rPr lang="en-US" smtClean="0"/>
-              <a:t>6/29/2012</a:t>
+              <a:t>7/4/2012</a:t>
             </a:fld>
             <a:endParaRPr lang="en-US"/>
           </a:p>
@@ -1677,7 +1678,7 @@
           <a:p>
             <a:fld id="{535550C0-5D70-4405-B956-2B4ED937123E}" type="datetimeFigureOut">
               <a:rPr lang="en-US" smtClean="0"/>
-              <a:t>6/29/2012</a:t>
+              <a:t>7/4/2012</a:t>
             </a:fld>
             <a:endParaRPr lang="en-US"/>
           </a:p>
@@ -1847,7 +1848,7 @@
           <a:p>
             <a:fld id="{535550C0-5D70-4405-B956-2B4ED937123E}" type="datetimeFigureOut">
               <a:rPr lang="en-US" smtClean="0"/>
-              <a:t>6/29/2012</a:t>
+              <a:t>7/4/2012</a:t>
             </a:fld>
             <a:endParaRPr lang="en-US"/>
           </a:p>
@@ -2093,7 +2094,7 @@
           <a:p>
             <a:fld id="{535550C0-5D70-4405-B956-2B4ED937123E}" type="datetimeFigureOut">
               <a:rPr lang="en-US" smtClean="0"/>
-              <a:t>6/29/2012</a:t>
+              <a:t>7/4/2012</a:t>
             </a:fld>
             <a:endParaRPr lang="en-US"/>
           </a:p>
@@ -2381,7 +2382,7 @@
           <a:p>
             <a:fld id="{535550C0-5D70-4405-B956-2B4ED937123E}" type="datetimeFigureOut">
               <a:rPr lang="en-US" smtClean="0"/>
-              <a:t>6/29/2012</a:t>
+              <a:t>7/4/2012</a:t>
             </a:fld>
             <a:endParaRPr lang="en-US"/>
           </a:p>
@@ -2803,7 +2804,7 @@
           <a:p>
             <a:fld id="{535550C0-5D70-4405-B956-2B4ED937123E}" type="datetimeFigureOut">
               <a:rPr lang="en-US" smtClean="0"/>
-              <a:t>6/29/2012</a:t>
+              <a:t>7/4/2012</a:t>
             </a:fld>
             <a:endParaRPr lang="en-US"/>
           </a:p>
@@ -2921,7 +2922,7 @@
           <a:p>
             <a:fld id="{535550C0-5D70-4405-B956-2B4ED937123E}" type="datetimeFigureOut">
               <a:rPr lang="en-US" smtClean="0"/>
-              <a:t>6/29/2012</a:t>
+              <a:t>7/4/2012</a:t>
             </a:fld>
             <a:endParaRPr lang="en-US"/>
           </a:p>
@@ -3016,7 +3017,7 @@
           <a:p>
             <a:fld id="{535550C0-5D70-4405-B956-2B4ED937123E}" type="datetimeFigureOut">
               <a:rPr lang="en-US" smtClean="0"/>
-              <a:t>6/29/2012</a:t>
+              <a:t>7/4/2012</a:t>
             </a:fld>
             <a:endParaRPr lang="en-US"/>
           </a:p>
@@ -3293,7 +3294,7 @@
           <a:p>
             <a:fld id="{535550C0-5D70-4405-B956-2B4ED937123E}" type="datetimeFigureOut">
               <a:rPr lang="en-US" smtClean="0"/>
-              <a:t>6/29/2012</a:t>
+              <a:t>7/4/2012</a:t>
             </a:fld>
             <a:endParaRPr lang="en-US"/>
           </a:p>
@@ -3467,7 +3468,7 @@
           <a:p>
             <a:fld id="{6A814141-4123-430A-9D32-7C9F93C128E8}" type="datetimeFigureOut">
               <a:rPr lang="en-US" smtClean="0"/>
-              <a:t>6/29/2012</a:t>
+              <a:t>7/4/2012</a:t>
             </a:fld>
             <a:endParaRPr lang="en-US"/>
           </a:p>
@@ -3727,7 +3728,7 @@
           <a:p>
             <a:fld id="{535550C0-5D70-4405-B956-2B4ED937123E}" type="datetimeFigureOut">
               <a:rPr lang="en-US" smtClean="0"/>
-              <a:t>6/29/2012</a:t>
+              <a:t>7/4/2012</a:t>
             </a:fld>
             <a:endParaRPr lang="en-US"/>
           </a:p>
@@ -3897,7 +3898,7 @@
           <a:p>
             <a:fld id="{535550C0-5D70-4405-B956-2B4ED937123E}" type="datetimeFigureOut">
               <a:rPr lang="en-US" smtClean="0"/>
-              <a:t>6/29/2012</a:t>
+              <a:t>7/4/2012</a:t>
             </a:fld>
             <a:endParaRPr lang="en-US"/>
           </a:p>
@@ -4077,7 +4078,7 @@
           <a:p>
             <a:fld id="{535550C0-5D70-4405-B956-2B4ED937123E}" type="datetimeFigureOut">
               <a:rPr lang="en-US" smtClean="0"/>
-              <a:t>6/29/2012</a:t>
+              <a:t>7/4/2012</a:t>
             </a:fld>
             <a:endParaRPr lang="en-US"/>
           </a:p>
@@ -4323,7 +4324,7 @@
           <a:p>
             <a:fld id="{6A814141-4123-430A-9D32-7C9F93C128E8}" type="datetimeFigureOut">
               <a:rPr lang="en-US" smtClean="0"/>
-              <a:t>6/29/2012</a:t>
+              <a:t>7/4/2012</a:t>
             </a:fld>
             <a:endParaRPr lang="en-US"/>
           </a:p>
@@ -4611,7 +4612,7 @@
           <a:p>
             <a:fld id="{6A814141-4123-430A-9D32-7C9F93C128E8}" type="datetimeFigureOut">
               <a:rPr lang="en-US" smtClean="0"/>
-              <a:t>6/29/2012</a:t>
+              <a:t>7/4/2012</a:t>
             </a:fld>
             <a:endParaRPr lang="en-US"/>
           </a:p>
@@ -5040,7 +5041,7 @@
           <a:p>
             <a:fld id="{6A814141-4123-430A-9D32-7C9F93C128E8}" type="datetimeFigureOut">
               <a:rPr lang="en-US" smtClean="0"/>
-              <a:t>6/29/2012</a:t>
+              <a:t>7/4/2012</a:t>
             </a:fld>
             <a:endParaRPr lang="en-US"/>
           </a:p>
@@ -5158,7 +5159,7 @@
           <a:p>
             <a:fld id="{6A814141-4123-430A-9D32-7C9F93C128E8}" type="datetimeFigureOut">
               <a:rPr lang="en-US" smtClean="0"/>
-              <a:t>6/29/2012</a:t>
+              <a:t>7/4/2012</a:t>
             </a:fld>
             <a:endParaRPr lang="en-US"/>
           </a:p>
@@ -5253,7 +5254,7 @@
           <a:p>
             <a:fld id="{6A814141-4123-430A-9D32-7C9F93C128E8}" type="datetimeFigureOut">
               <a:rPr lang="en-US" smtClean="0"/>
-              <a:t>6/29/2012</a:t>
+              <a:t>7/4/2012</a:t>
             </a:fld>
             <a:endParaRPr lang="en-US"/>
           </a:p>
@@ -5530,7 +5531,7 @@
           <a:p>
             <a:fld id="{6A814141-4123-430A-9D32-7C9F93C128E8}" type="datetimeFigureOut">
               <a:rPr lang="en-US" smtClean="0"/>
-              <a:t>6/29/2012</a:t>
+              <a:t>7/4/2012</a:t>
             </a:fld>
             <a:endParaRPr lang="en-US"/>
           </a:p>
@@ -5783,7 +5784,7 @@
           <a:p>
             <a:fld id="{6A814141-4123-430A-9D32-7C9F93C128E8}" type="datetimeFigureOut">
               <a:rPr lang="en-US" smtClean="0"/>
-              <a:t>6/29/2012</a:t>
+              <a:t>7/4/2012</a:t>
             </a:fld>
             <a:endParaRPr lang="en-US"/>
           </a:p>
@@ -5996,7 +5997,7 @@
           <a:p>
             <a:fld id="{6A814141-4123-430A-9D32-7C9F93C128E8}" type="datetimeFigureOut">
               <a:rPr lang="en-US" smtClean="0"/>
-              <a:t>6/29/2012</a:t>
+              <a:t>7/4/2012</a:t>
             </a:fld>
             <a:endParaRPr lang="en-US"/>
           </a:p>
@@ -6513,7 +6514,7 @@
           <a:p>
             <a:fld id="{535550C0-5D70-4405-B956-2B4ED937123E}" type="datetimeFigureOut">
               <a:rPr lang="en-US" smtClean="0"/>
-              <a:t>6/29/2012</a:t>
+              <a:t>7/4/2012</a:t>
             </a:fld>
             <a:endParaRPr lang="en-US"/>
           </a:p>
@@ -7010,6 +7011,514 @@
             <a:spLocks noGrp="1"/>
           </p:cNvSpPr>
           <p:nvPr>
+            <p:ph type="ctrTitle"/>
+          </p:nvPr>
+        </p:nvSpPr>
+        <p:spPr/>
+        <p:txBody>
+          <a:bodyPr/>
+          <a:lstStyle/>
+          <a:p>
+            <a:r>
+              <a:rPr lang="en-US" u="sng" dirty="0" smtClean="0"/>
+              <a:t>Brief for other candidates and their major weakness</a:t>
+            </a:r>
+            <a:endParaRPr lang="en-US" u="sng" dirty="0"/>
+          </a:p>
+        </p:txBody>
+      </p:sp>
+      <p:sp>
+        <p:nvSpPr>
+          <p:cNvPr id="3" name="Subtitle 2"/>
+          <p:cNvSpPr>
+            <a:spLocks noGrp="1"/>
+          </p:cNvSpPr>
+          <p:nvPr>
+            <p:ph type="subTitle" idx="1"/>
+          </p:nvPr>
+        </p:nvSpPr>
+        <p:spPr/>
+        <p:txBody>
+          <a:bodyPr/>
+          <a:lstStyle/>
+          <a:p>
+            <a:endParaRPr lang="en-US"/>
+          </a:p>
+        </p:txBody>
+      </p:sp>
+    </p:spTree>
+    <p:extLst>
+      <p:ext uri="{BB962C8B-B14F-4D97-AF65-F5344CB8AC3E}">
+        <p14:creationId xmlns:p14="http://schemas.microsoft.com/office/powerpoint/2010/main" val="1144100807"/>
+      </p:ext>
+    </p:extLst>
+  </p:cSld>
+  <p:clrMapOvr>
+    <a:masterClrMapping/>
+  </p:clrMapOvr>
+  <p:timing>
+    <p:tnLst>
+      <p:par>
+        <p:cTn id="1" dur="indefinite" restart="never" nodeType="tmRoot"/>
+      </p:par>
+    </p:tnLst>
+  </p:timing>
+</p:sld>
+</file>
+
+<file path=ppt/slides/slide11.xml><?xml version="1.0" encoding="utf-8"?>
+<p:sld xmlns:a="http://schemas.openxmlformats.org/drawingml/2006/main" xmlns:r="http://schemas.openxmlformats.org/officeDocument/2006/relationships" xmlns:p="http://schemas.openxmlformats.org/presentationml/2006/main">
+  <p:cSld>
+    <p:spTree>
+      <p:nvGrpSpPr>
+        <p:cNvPr id="1" name=""/>
+        <p:cNvGrpSpPr/>
+        <p:nvPr/>
+      </p:nvGrpSpPr>
+      <p:grpSpPr>
+        <a:xfrm>
+          <a:off x="0" y="0"/>
+          <a:ext cx="0" cy="0"/>
+          <a:chOff x="0" y="0"/>
+          <a:chExt cx="0" cy="0"/>
+        </a:xfrm>
+      </p:grpSpPr>
+      <p:sp>
+        <p:nvSpPr>
+          <p:cNvPr id="2" name="Title 1"/>
+          <p:cNvSpPr>
+            <a:spLocks noGrp="1"/>
+          </p:cNvSpPr>
+          <p:nvPr>
+            <p:ph type="title"/>
+          </p:nvPr>
+        </p:nvSpPr>
+        <p:spPr/>
+        <p:txBody>
+          <a:bodyPr/>
+          <a:lstStyle/>
+          <a:p>
+            <a:r>
+              <a:rPr lang="en-US" u="sng" dirty="0" smtClean="0"/>
+              <a:t>Quadrant Standard Edition</a:t>
+            </a:r>
+            <a:endParaRPr lang="en-US" u="sng" dirty="0"/>
+          </a:p>
+        </p:txBody>
+      </p:sp>
+      <p:sp>
+        <p:nvSpPr>
+          <p:cNvPr id="4" name="Content Placeholder 3"/>
+          <p:cNvSpPr>
+            <a:spLocks noGrp="1"/>
+          </p:cNvSpPr>
+          <p:nvPr>
+            <p:ph sz="half" idx="1"/>
+          </p:nvPr>
+        </p:nvSpPr>
+        <p:spPr/>
+        <p:txBody>
+          <a:bodyPr>
+            <a:normAutofit lnSpcReduction="10000"/>
+          </a:bodyPr>
+          <a:lstStyle/>
+          <a:p>
+            <a:r>
+              <a:rPr lang="en-US" sz="2600" dirty="0" smtClean="0"/>
+              <a:t>Runs </a:t>
+            </a:r>
+            <a:r>
+              <a:rPr lang="en-US" sz="2600" dirty="0"/>
+              <a:t>tests on the following parts</a:t>
+            </a:r>
+          </a:p>
+          <a:p>
+            <a:pPr lvl="1"/>
+            <a:r>
+              <a:rPr lang="en-US" sz="2200" dirty="0" smtClean="0"/>
+              <a:t>CPU </a:t>
+            </a:r>
+            <a:r>
+              <a:rPr lang="en-US" sz="2200" dirty="0"/>
+              <a:t>- arithmetic operations, XML parsing, multimedia decoding</a:t>
+            </a:r>
+          </a:p>
+          <a:p>
+            <a:pPr lvl="1"/>
+            <a:r>
+              <a:rPr lang="en-US" sz="2200" dirty="0"/>
+              <a:t>Memory throughput</a:t>
+            </a:r>
+          </a:p>
+          <a:p>
+            <a:pPr lvl="1"/>
+            <a:r>
+              <a:rPr lang="en-US" sz="2200" dirty="0"/>
+              <a:t>I/O </a:t>
+            </a:r>
+            <a:r>
+              <a:rPr lang="en-US" sz="2200" dirty="0" smtClean="0"/>
+              <a:t>– file system </a:t>
+            </a:r>
+            <a:r>
+              <a:rPr lang="en-US" sz="2200" dirty="0"/>
+              <a:t>access and database operations</a:t>
+            </a:r>
+          </a:p>
+          <a:p>
+            <a:pPr lvl="1"/>
+            <a:r>
+              <a:rPr lang="en-US" sz="2200" dirty="0"/>
+              <a:t>2D graphics</a:t>
+            </a:r>
+          </a:p>
+          <a:p>
+            <a:pPr lvl="1"/>
+            <a:r>
+              <a:rPr lang="en-US" sz="2200" dirty="0"/>
+              <a:t>3D graphics - OpenGL single-pass and multi-pass rendering with stencil </a:t>
+            </a:r>
+            <a:r>
+              <a:rPr lang="en-US" sz="2200" dirty="0" smtClean="0"/>
+              <a:t>buffers</a:t>
+            </a:r>
+            <a:endParaRPr lang="en-US" sz="2200" dirty="0"/>
+          </a:p>
+        </p:txBody>
+      </p:sp>
+      <p:pic>
+        <p:nvPicPr>
+          <p:cNvPr id="3" name="Content Placeholder 2"/>
+          <p:cNvPicPr>
+            <a:picLocks noGrp="1" noChangeAspect="1"/>
+          </p:cNvPicPr>
+          <p:nvPr>
+            <p:ph sz="half" idx="2"/>
+          </p:nvPr>
+        </p:nvPicPr>
+        <p:blipFill>
+          <a:blip r:embed="rId2">
+            <a:extLst>
+              <a:ext uri="{28A0092B-C50C-407E-A947-70E740481C1C}">
+                <a14:useLocalDpi xmlns:a14="http://schemas.microsoft.com/office/drawing/2010/main" val="0"/>
+              </a:ext>
+            </a:extLst>
+          </a:blip>
+          <a:stretch>
+            <a:fillRect/>
+          </a:stretch>
+        </p:blipFill>
+        <p:spPr>
+          <a:xfrm>
+            <a:off x="4535728" y="2209800"/>
+            <a:ext cx="2052108" cy="3200400"/>
+          </a:xfrm>
+        </p:spPr>
+      </p:pic>
+      <p:pic>
+        <p:nvPicPr>
+          <p:cNvPr id="6" name="Picture 5"/>
+          <p:cNvPicPr>
+            <a:picLocks noChangeAspect="1"/>
+          </p:cNvPicPr>
+          <p:nvPr/>
+        </p:nvPicPr>
+        <p:blipFill>
+          <a:blip r:embed="rId3">
+            <a:extLst>
+              <a:ext uri="{28A0092B-C50C-407E-A947-70E740481C1C}">
+                <a14:useLocalDpi xmlns:a14="http://schemas.microsoft.com/office/drawing/2010/main" val="0"/>
+              </a:ext>
+            </a:extLst>
+          </a:blip>
+          <a:stretch>
+            <a:fillRect/>
+          </a:stretch>
+        </p:blipFill>
+        <p:spPr>
+          <a:xfrm>
+            <a:off x="6629400" y="2209800"/>
+            <a:ext cx="2133600" cy="3200400"/>
+          </a:xfrm>
+          <a:prstGeom prst="rect">
+            <a:avLst/>
+          </a:prstGeom>
+        </p:spPr>
+      </p:pic>
+    </p:spTree>
+    <p:extLst>
+      <p:ext uri="{BB962C8B-B14F-4D97-AF65-F5344CB8AC3E}">
+        <p14:creationId xmlns:p14="http://schemas.microsoft.com/office/powerpoint/2010/main" val="1804225097"/>
+      </p:ext>
+    </p:extLst>
+  </p:cSld>
+  <p:clrMapOvr>
+    <a:masterClrMapping/>
+  </p:clrMapOvr>
+  <p:timing>
+    <p:tnLst>
+      <p:par>
+        <p:cTn id="1" dur="indefinite" restart="never" nodeType="tmRoot"/>
+      </p:par>
+    </p:tnLst>
+  </p:timing>
+</p:sld>
+</file>
+
+<file path=ppt/slides/slide12.xml><?xml version="1.0" encoding="utf-8"?>
+<p:sld xmlns:a="http://schemas.openxmlformats.org/drawingml/2006/main" xmlns:r="http://schemas.openxmlformats.org/officeDocument/2006/relationships" xmlns:p="http://schemas.openxmlformats.org/presentationml/2006/main">
+  <p:cSld>
+    <p:spTree>
+      <p:nvGrpSpPr>
+        <p:cNvPr id="1" name=""/>
+        <p:cNvGrpSpPr/>
+        <p:nvPr/>
+      </p:nvGrpSpPr>
+      <p:grpSpPr>
+        <a:xfrm>
+          <a:off x="0" y="0"/>
+          <a:ext cx="0" cy="0"/>
+          <a:chOff x="0" y="0"/>
+          <a:chExt cx="0" cy="0"/>
+        </a:xfrm>
+      </p:grpSpPr>
+      <p:sp>
+        <p:nvSpPr>
+          <p:cNvPr id="2" name="Title 1"/>
+          <p:cNvSpPr>
+            <a:spLocks noGrp="1"/>
+          </p:cNvSpPr>
+          <p:nvPr>
+            <p:ph type="title"/>
+          </p:nvPr>
+        </p:nvSpPr>
+        <p:spPr/>
+        <p:txBody>
+          <a:bodyPr/>
+          <a:lstStyle/>
+          <a:p>
+            <a:pPr marL="0" marR="0" indent="0" algn="ctr" defTabSz="914400" rtl="0" eaLnBrk="1" fontAlgn="auto" latinLnBrk="0" hangingPunct="1">
+              <a:lnSpc>
+                <a:spcPct val="100000"/>
+              </a:lnSpc>
+              <a:spcBef>
+                <a:spcPct val="0"/>
+              </a:spcBef>
+              <a:spcAft>
+                <a:spcPts val="0"/>
+              </a:spcAft>
+              <a:buClrTx/>
+              <a:buSzTx/>
+              <a:buFontTx/>
+              <a:buNone/>
+              <a:tabLst/>
+              <a:defRPr/>
+            </a:pPr>
+            <a:r>
+              <a:rPr lang="en-US" sz="3600" u="sng" kern="1200" dirty="0" smtClean="0">
+                <a:solidFill>
+                  <a:schemeClr val="tx1"/>
+                </a:solidFill>
+                <a:effectLst/>
+              </a:rPr>
+              <a:t>SD Tool </a:t>
+            </a:r>
+            <a:endParaRPr lang="en-US" u="sng" dirty="0"/>
+          </a:p>
+        </p:txBody>
+      </p:sp>
+      <p:sp>
+        <p:nvSpPr>
+          <p:cNvPr id="3" name="Content Placeholder 2"/>
+          <p:cNvSpPr>
+            <a:spLocks noGrp="1"/>
+          </p:cNvSpPr>
+          <p:nvPr>
+            <p:ph sz="half" idx="1"/>
+          </p:nvPr>
+        </p:nvSpPr>
+        <p:spPr/>
+        <p:txBody>
+          <a:bodyPr>
+            <a:normAutofit/>
+          </a:bodyPr>
+          <a:lstStyle/>
+          <a:p>
+            <a:r>
+              <a:rPr lang="en-US" dirty="0"/>
+              <a:t>benchmark </a:t>
+            </a:r>
+            <a:r>
+              <a:rPr lang="en-US" dirty="0" smtClean="0"/>
+              <a:t>SD </a:t>
+            </a:r>
+            <a:r>
+              <a:rPr lang="en-US" dirty="0"/>
+              <a:t>card writing and reading </a:t>
+            </a:r>
+            <a:r>
+              <a:rPr lang="en-US" dirty="0" smtClean="0"/>
+              <a:t>speeds</a:t>
+            </a:r>
+            <a:endParaRPr lang="en-US" dirty="0"/>
+          </a:p>
+          <a:p>
+            <a:r>
+              <a:rPr lang="en-US" dirty="0" smtClean="0"/>
+              <a:t>Reason for not choosing:</a:t>
+            </a:r>
+          </a:p>
+          <a:p>
+            <a:pPr lvl="1"/>
+            <a:r>
+              <a:rPr lang="en-US" dirty="0" smtClean="0"/>
+              <a:t>Tests on SD writing and reading are already included in the testing done by </a:t>
+            </a:r>
+            <a:r>
+              <a:rPr lang="en-US" dirty="0" err="1" smtClean="0"/>
+              <a:t>AnTuTu</a:t>
+            </a:r>
+            <a:r>
+              <a:rPr lang="en-US" dirty="0" smtClean="0"/>
+              <a:t> Benchmark </a:t>
+            </a:r>
+            <a:endParaRPr lang="en-US" dirty="0"/>
+          </a:p>
+        </p:txBody>
+      </p:sp>
+      <p:pic>
+        <p:nvPicPr>
+          <p:cNvPr id="4" name="Content Placeholder 3"/>
+          <p:cNvPicPr>
+            <a:picLocks noGrp="1" noChangeAspect="1"/>
+          </p:cNvPicPr>
+          <p:nvPr>
+            <p:ph sz="half" idx="2"/>
+          </p:nvPr>
+        </p:nvPicPr>
+        <p:blipFill>
+          <a:blip r:embed="rId2">
+            <a:extLst>
+              <a:ext uri="{28A0092B-C50C-407E-A947-70E740481C1C}">
+                <a14:useLocalDpi xmlns:a14="http://schemas.microsoft.com/office/drawing/2010/main" val="0"/>
+              </a:ext>
+            </a:extLst>
+          </a:blip>
+          <a:stretch>
+            <a:fillRect/>
+          </a:stretch>
+        </p:blipFill>
+        <p:spPr>
+          <a:xfrm>
+            <a:off x="4419600" y="1600200"/>
+            <a:ext cx="2234781" cy="3715472"/>
+          </a:xfrm>
+        </p:spPr>
+      </p:pic>
+      <p:pic>
+        <p:nvPicPr>
+          <p:cNvPr id="6" name="Picture 5"/>
+          <p:cNvPicPr>
+            <a:picLocks noChangeAspect="1"/>
+          </p:cNvPicPr>
+          <p:nvPr/>
+        </p:nvPicPr>
+        <p:blipFill>
+          <a:blip r:embed="rId3">
+            <a:extLst>
+              <a:ext uri="{28A0092B-C50C-407E-A947-70E740481C1C}">
+                <a14:useLocalDpi xmlns:a14="http://schemas.microsoft.com/office/drawing/2010/main" val="0"/>
+              </a:ext>
+            </a:extLst>
+          </a:blip>
+          <a:stretch>
+            <a:fillRect/>
+          </a:stretch>
+        </p:blipFill>
+        <p:spPr>
+          <a:xfrm>
+            <a:off x="5562600" y="457200"/>
+            <a:ext cx="742950" cy="742950"/>
+          </a:xfrm>
+          <a:prstGeom prst="rect">
+            <a:avLst/>
+          </a:prstGeom>
+        </p:spPr>
+      </p:pic>
+      <p:pic>
+        <p:nvPicPr>
+          <p:cNvPr id="5" name="Picture 4"/>
+          <p:cNvPicPr>
+            <a:picLocks noChangeAspect="1"/>
+          </p:cNvPicPr>
+          <p:nvPr/>
+        </p:nvPicPr>
+        <p:blipFill>
+          <a:blip r:embed="rId4">
+            <a:extLst>
+              <a:ext uri="{28A0092B-C50C-407E-A947-70E740481C1C}">
+                <a14:useLocalDpi xmlns:a14="http://schemas.microsoft.com/office/drawing/2010/main" val="0"/>
+              </a:ext>
+            </a:extLst>
+          </a:blip>
+          <a:stretch>
+            <a:fillRect/>
+          </a:stretch>
+        </p:blipFill>
+        <p:spPr>
+          <a:xfrm>
+            <a:off x="6781800" y="1600200"/>
+            <a:ext cx="2209800" cy="3683000"/>
+          </a:xfrm>
+          <a:prstGeom prst="rect">
+            <a:avLst/>
+          </a:prstGeom>
+        </p:spPr>
+      </p:pic>
+    </p:spTree>
+    <p:extLst>
+      <p:ext uri="{BB962C8B-B14F-4D97-AF65-F5344CB8AC3E}">
+        <p14:creationId xmlns:p14="http://schemas.microsoft.com/office/powerpoint/2010/main" val="2211510816"/>
+      </p:ext>
+    </p:extLst>
+  </p:cSld>
+  <p:clrMapOvr>
+    <a:masterClrMapping/>
+  </p:clrMapOvr>
+  <p:timing>
+    <p:tnLst>
+      <p:par>
+        <p:cTn id="1" dur="indefinite" restart="never" nodeType="tmRoot"/>
+      </p:par>
+    </p:tnLst>
+  </p:timing>
+</p:sld>
+</file>
+
+<file path=ppt/slides/slide13.xml><?xml version="1.0" encoding="utf-8"?>
+<p:sld xmlns:a="http://schemas.openxmlformats.org/drawingml/2006/main" xmlns:r="http://schemas.openxmlformats.org/officeDocument/2006/relationships" xmlns:p="http://schemas.openxmlformats.org/presentationml/2006/main">
+  <p:cSld>
+    <p:spTree>
+      <p:nvGrpSpPr>
+        <p:cNvPr id="1" name=""/>
+        <p:cNvGrpSpPr/>
+        <p:nvPr/>
+      </p:nvGrpSpPr>
+      <p:grpSpPr>
+        <a:xfrm>
+          <a:off x="0" y="0"/>
+          <a:ext cx="0" cy="0"/>
+          <a:chOff x="0" y="0"/>
+          <a:chExt cx="0" cy="0"/>
+        </a:xfrm>
+      </p:grpSpPr>
+      <p:sp>
+        <p:nvSpPr>
+          <p:cNvPr id="2" name="Title 1"/>
+          <p:cNvSpPr>
+            <a:spLocks noGrp="1"/>
+          </p:cNvSpPr>
+          <p:nvPr>
             <p:ph type="title"/>
           </p:nvPr>
         </p:nvSpPr>
@@ -7236,7 +7745,7 @@
 </p:sld>
 </file>
 
-<file path=ppt/slides/slide11.xml><?xml version="1.0" encoding="utf-8"?>
+<file path=ppt/slides/slide14.xml><?xml version="1.0" encoding="utf-8"?>
 <p:sld xmlns:a="http://schemas.openxmlformats.org/drawingml/2006/main" xmlns:r="http://schemas.openxmlformats.org/officeDocument/2006/relationships" xmlns:p="http://schemas.openxmlformats.org/presentationml/2006/main">
   <p:cSld>
     <p:spTree>
@@ -7373,11 +7882,7 @@
             </a:r>
             <a:r>
               <a:rPr lang="en-US" dirty="0" smtClean="0"/>
-              <a:t> </a:t>
-            </a:r>
-            <a:r>
-              <a:rPr lang="en-US" dirty="0" smtClean="0"/>
-              <a:t>Benchmark</a:t>
+              <a:t> Benchmark</a:t>
             </a:r>
             <a:endParaRPr lang="en-US" dirty="0"/>
           </a:p>
@@ -7462,7 +7967,7 @@
 </p:sld>
 </file>
 
-<file path=ppt/slides/slide12.xml><?xml version="1.0" encoding="utf-8"?>
+<file path=ppt/slides/slide15.xml><?xml version="1.0" encoding="utf-8"?>
 <p:sld xmlns:a="http://schemas.openxmlformats.org/drawingml/2006/main" xmlns:r="http://schemas.openxmlformats.org/officeDocument/2006/relationships" xmlns:p="http://schemas.openxmlformats.org/presentationml/2006/main">
   <p:cSld>
     <p:spTree>
@@ -7578,11 +8083,7 @@
             </a:r>
             <a:r>
               <a:rPr lang="en-US" dirty="0" smtClean="0"/>
-              <a:t> </a:t>
-            </a:r>
-            <a:r>
-              <a:rPr lang="en-US" dirty="0" smtClean="0"/>
-              <a:t>Benchmark</a:t>
+              <a:t> Benchmark</a:t>
             </a:r>
             <a:endParaRPr lang="en-US" dirty="0"/>
           </a:p>
@@ -7667,7 +8168,7 @@
 </p:sld>
 </file>
 
-<file path=ppt/slides/slide13.xml><?xml version="1.0" encoding="utf-8"?>
+<file path=ppt/slides/slide16.xml><?xml version="1.0" encoding="utf-8"?>
 <p:sld xmlns:a="http://schemas.openxmlformats.org/drawingml/2006/main" xmlns:r="http://schemas.openxmlformats.org/officeDocument/2006/relationships" xmlns:p="http://schemas.openxmlformats.org/presentationml/2006/main">
   <p:cSld>
     <p:spTree>
@@ -7897,7 +8398,7 @@
 </p:sld>
 </file>
 
-<file path=ppt/slides/slide14.xml><?xml version="1.0" encoding="utf-8"?>
+<file path=ppt/slides/slide17.xml><?xml version="1.0" encoding="utf-8"?>
 <p:sld xmlns:a="http://schemas.openxmlformats.org/drawingml/2006/main" xmlns:r="http://schemas.openxmlformats.org/officeDocument/2006/relationships" xmlns:p="http://schemas.openxmlformats.org/presentationml/2006/main">
   <p:cSld>
     <p:spTree>
@@ -8147,7 +8648,7 @@
 </p:sld>
 </file>
 
-<file path=ppt/slides/slide15.xml><?xml version="1.0" encoding="utf-8"?>
+<file path=ppt/slides/slide18.xml><?xml version="1.0" encoding="utf-8"?>
 <p:sld xmlns:a="http://schemas.openxmlformats.org/drawingml/2006/main" xmlns:r="http://schemas.openxmlformats.org/officeDocument/2006/relationships" xmlns:p="http://schemas.openxmlformats.org/presentationml/2006/main">
   <p:cSld>
     <p:spTree>
@@ -8338,7 +8839,7 @@
 </p:sld>
 </file>
 
-<file path=ppt/slides/slide16.xml><?xml version="1.0" encoding="utf-8"?>
+<file path=ppt/slides/slide2.xml><?xml version="1.0" encoding="utf-8"?>
 <p:sld xmlns:a="http://schemas.openxmlformats.org/drawingml/2006/main" xmlns:r="http://schemas.openxmlformats.org/officeDocument/2006/relationships" xmlns:p="http://schemas.openxmlformats.org/presentationml/2006/main">
   <p:cSld>
     <p:spTree>
@@ -8373,8 +8874,216 @@
           <a:lstStyle/>
           <a:p>
             <a:r>
+              <a:rPr lang="en-US" sz="4400" u="sng" dirty="0" smtClean="0"/>
+              <a:t>Most popular tools are evaluated</a:t>
+            </a:r>
+            <a:endParaRPr lang="en-US" sz="4400" u="sng" dirty="0"/>
+          </a:p>
+        </p:txBody>
+      </p:sp>
+      <p:sp>
+        <p:nvSpPr>
+          <p:cNvPr id="3" name="Content Placeholder 2"/>
+          <p:cNvSpPr>
+            <a:spLocks noGrp="1"/>
+          </p:cNvSpPr>
+          <p:nvPr>
+            <p:ph idx="1"/>
+          </p:nvPr>
+        </p:nvSpPr>
+        <p:spPr>
+          <a:xfrm>
+            <a:off x="457200" y="1371600"/>
+            <a:ext cx="8229600" cy="5257800"/>
+          </a:xfrm>
+        </p:spPr>
+        <p:txBody>
+          <a:bodyPr>
+            <a:normAutofit fontScale="92500" lnSpcReduction="20000"/>
+          </a:bodyPr>
+          <a:lstStyle/>
+          <a:p>
+            <a:pPr marL="514350" lvl="0" indent="-514350">
+              <a:buFont typeface="+mj-lt"/>
+              <a:buAutoNum type="arabicPeriod"/>
+            </a:pPr>
+            <a:r>
+              <a:rPr lang="en-US" dirty="0" err="1" smtClean="0"/>
+              <a:t>AnTuTu</a:t>
+            </a:r>
+            <a:r>
+              <a:rPr lang="en-US" dirty="0" smtClean="0"/>
+              <a:t> Benchmark</a:t>
+            </a:r>
+          </a:p>
+          <a:p>
+            <a:pPr marL="514350" lvl="0" indent="-514350">
+              <a:buFont typeface="+mj-lt"/>
+              <a:buAutoNum type="arabicPeriod"/>
+            </a:pPr>
+            <a:r>
+              <a:rPr lang="en-US" dirty="0" smtClean="0"/>
+              <a:t>Quadrant Standard Edition</a:t>
+            </a:r>
+          </a:p>
+          <a:p>
+            <a:pPr marL="514350" lvl="0" indent="-514350">
+              <a:buFont typeface="+mj-lt"/>
+              <a:buAutoNum type="arabicPeriod"/>
+            </a:pPr>
+            <a:r>
+              <a:rPr lang="en-US" dirty="0" err="1" smtClean="0"/>
+              <a:t>Vellamo</a:t>
+            </a:r>
+            <a:r>
+              <a:rPr lang="en-US" dirty="0" smtClean="0"/>
+              <a:t> Mobile Web Benchmark</a:t>
+            </a:r>
+          </a:p>
+          <a:p>
+            <a:pPr marL="514350" indent="-514350">
+              <a:buFont typeface="+mj-lt"/>
+              <a:buAutoNum type="arabicPeriod"/>
+            </a:pPr>
+            <a:r>
+              <a:rPr lang="en-US" dirty="0" err="1" smtClean="0"/>
+              <a:t>GlBenchmark</a:t>
+            </a:r>
+            <a:endParaRPr lang="en-US" dirty="0" smtClean="0"/>
+          </a:p>
+          <a:p>
+            <a:pPr marL="514350" indent="-514350">
+              <a:buFont typeface="+mj-lt"/>
+              <a:buAutoNum type="arabicPeriod"/>
+            </a:pPr>
+            <a:r>
+              <a:rPr lang="en-US" dirty="0" smtClean="0"/>
+              <a:t>SD Tool</a:t>
+            </a:r>
+          </a:p>
+          <a:p>
+            <a:pPr marL="514350" indent="-514350">
+              <a:buFont typeface="+mj-lt"/>
+              <a:buAutoNum type="arabicPeriod"/>
+            </a:pPr>
+            <a:r>
+              <a:rPr lang="en-US" dirty="0" smtClean="0"/>
+              <a:t>CF-Bench</a:t>
+            </a:r>
+          </a:p>
+          <a:p>
+            <a:pPr marL="514350" indent="-514350">
+              <a:buFont typeface="+mj-lt"/>
+              <a:buAutoNum type="arabicPeriod"/>
+            </a:pPr>
+            <a:r>
+              <a:rPr lang="en-US" dirty="0" err="1" smtClean="0"/>
+              <a:t>Linpack</a:t>
+            </a:r>
+            <a:r>
+              <a:rPr lang="en-US" dirty="0" smtClean="0"/>
+              <a:t> for Android</a:t>
+            </a:r>
+          </a:p>
+          <a:p>
+            <a:pPr marL="514350" indent="-514350">
+              <a:buFont typeface="+mj-lt"/>
+              <a:buAutoNum type="arabicPeriod"/>
+            </a:pPr>
+            <a:r>
+              <a:rPr lang="en-US" dirty="0" smtClean="0"/>
+              <a:t>CPU Benchmark</a:t>
+            </a:r>
+          </a:p>
+          <a:p>
+            <a:pPr marL="514350" indent="-514350">
+              <a:buFont typeface="+mj-lt"/>
+              <a:buAutoNum type="arabicPeriod"/>
+            </a:pPr>
+            <a:r>
+              <a:rPr lang="en-US" dirty="0" err="1" smtClean="0"/>
+              <a:t>RealPi</a:t>
+            </a:r>
+            <a:endParaRPr lang="en-US" dirty="0" smtClean="0"/>
+          </a:p>
+          <a:p>
+            <a:pPr marL="514350" indent="-514350">
+              <a:buFont typeface="+mj-lt"/>
+              <a:buAutoNum type="arabicPeriod"/>
+            </a:pPr>
+            <a:r>
+              <a:rPr lang="en-US" dirty="0" smtClean="0"/>
+              <a:t>NenaMark2</a:t>
+            </a:r>
+          </a:p>
+          <a:p>
+            <a:pPr marL="514350" indent="-514350">
+              <a:buFont typeface="+mj-lt"/>
+              <a:buAutoNum type="arabicPeriod"/>
+            </a:pPr>
+            <a:r>
+              <a:rPr lang="en-US" dirty="0" err="1" smtClean="0"/>
+              <a:t>Neocore</a:t>
+            </a:r>
+            <a:endParaRPr lang="en-US" dirty="0" smtClean="0"/>
+          </a:p>
+        </p:txBody>
+      </p:sp>
+    </p:spTree>
+    <p:extLst>
+      <p:ext uri="{BB962C8B-B14F-4D97-AF65-F5344CB8AC3E}">
+        <p14:creationId xmlns:p14="http://schemas.microsoft.com/office/powerpoint/2010/main" val="3715149438"/>
+      </p:ext>
+    </p:extLst>
+  </p:cSld>
+  <p:clrMapOvr>
+    <a:masterClrMapping/>
+  </p:clrMapOvr>
+  <p:timing>
+    <p:tnLst>
+      <p:par>
+        <p:cTn id="1" dur="indefinite" restart="never" nodeType="tmRoot"/>
+      </p:par>
+    </p:tnLst>
+  </p:timing>
+</p:sld>
+</file>
+
+<file path=ppt/slides/slide3.xml><?xml version="1.0" encoding="utf-8"?>
+<p:sld xmlns:a="http://schemas.openxmlformats.org/drawingml/2006/main" xmlns:r="http://schemas.openxmlformats.org/officeDocument/2006/relationships" xmlns:p="http://schemas.openxmlformats.org/presentationml/2006/main">
+  <p:cSld>
+    <p:spTree>
+      <p:nvGrpSpPr>
+        <p:cNvPr id="1" name=""/>
+        <p:cNvGrpSpPr/>
+        <p:nvPr/>
+      </p:nvGrpSpPr>
+      <p:grpSpPr>
+        <a:xfrm>
+          <a:off x="0" y="0"/>
+          <a:ext cx="0" cy="0"/>
+          <a:chOff x="0" y="0"/>
+          <a:chExt cx="0" cy="0"/>
+        </a:xfrm>
+      </p:grpSpPr>
+      <p:sp>
+        <p:nvSpPr>
+          <p:cNvPr id="2" name="Title 1"/>
+          <p:cNvSpPr>
+            <a:spLocks noGrp="1"/>
+          </p:cNvSpPr>
+          <p:nvPr>
+            <p:ph type="title"/>
+          </p:nvPr>
+        </p:nvSpPr>
+        <p:spPr/>
+        <p:txBody>
+          <a:bodyPr/>
+          <a:lstStyle/>
+          <a:p>
+            <a:r>
               <a:rPr lang="en-US" u="sng" dirty="0" smtClean="0"/>
-              <a:t>Overall Score Calculation</a:t>
+              <a:t>3 of them are selected</a:t>
             </a:r>
             <a:endParaRPr lang="en-US" u="sng" dirty="0"/>
           </a:p>
@@ -8388,6 +9097,856 @@
           </p:cNvSpPr>
           <p:nvPr>
             <p:ph idx="1"/>
+          </p:nvPr>
+        </p:nvSpPr>
+        <p:spPr/>
+        <p:txBody>
+          <a:bodyPr/>
+          <a:lstStyle/>
+          <a:p>
+            <a:pPr marL="514350" lvl="0" indent="-514350">
+              <a:buFont typeface="+mj-lt"/>
+              <a:buAutoNum type="arabicPeriod"/>
+            </a:pPr>
+            <a:r>
+              <a:rPr lang="en-US" dirty="0" err="1"/>
+              <a:t>AnTuTu</a:t>
+            </a:r>
+            <a:r>
+              <a:rPr lang="en-US" dirty="0"/>
+              <a:t> Benchmark</a:t>
+            </a:r>
+          </a:p>
+          <a:p>
+            <a:pPr marL="514350" lvl="0" indent="-514350">
+              <a:buFont typeface="+mj-lt"/>
+              <a:buAutoNum type="arabicPeriod"/>
+            </a:pPr>
+            <a:r>
+              <a:rPr lang="en-US" dirty="0" err="1"/>
+              <a:t>Vellamo</a:t>
+            </a:r>
+            <a:r>
+              <a:rPr lang="en-US" dirty="0"/>
+              <a:t> Mobile Web Benchmark</a:t>
+            </a:r>
+          </a:p>
+          <a:p>
+            <a:pPr marL="0" indent="0">
+              <a:buNone/>
+            </a:pPr>
+            <a:r>
+              <a:rPr lang="en-US" dirty="0" smtClean="0"/>
+              <a:t>3. </a:t>
+            </a:r>
+            <a:r>
+              <a:rPr lang="en-US" dirty="0" err="1" smtClean="0"/>
+              <a:t>GlBenchmark</a:t>
+            </a:r>
+            <a:r>
+              <a:rPr lang="en-US" dirty="0" smtClean="0"/>
+              <a:t> (for additional information)</a:t>
+            </a:r>
+            <a:endParaRPr lang="en-US" dirty="0"/>
+          </a:p>
+        </p:txBody>
+      </p:sp>
+    </p:spTree>
+    <p:extLst>
+      <p:ext uri="{BB962C8B-B14F-4D97-AF65-F5344CB8AC3E}">
+        <p14:creationId xmlns:p14="http://schemas.microsoft.com/office/powerpoint/2010/main" val="4259909232"/>
+      </p:ext>
+    </p:extLst>
+  </p:cSld>
+  <p:clrMapOvr>
+    <a:masterClrMapping/>
+  </p:clrMapOvr>
+  <p:timing>
+    <p:tnLst>
+      <p:par>
+        <p:cTn id="1" dur="indefinite" restart="never" nodeType="tmRoot"/>
+      </p:par>
+    </p:tnLst>
+  </p:timing>
+</p:sld>
+</file>
+
+<file path=ppt/slides/slide4.xml><?xml version="1.0" encoding="utf-8"?>
+<p:sld xmlns:a="http://schemas.openxmlformats.org/drawingml/2006/main" xmlns:r="http://schemas.openxmlformats.org/officeDocument/2006/relationships" xmlns:p="http://schemas.openxmlformats.org/presentationml/2006/main">
+  <p:cSld>
+    <p:spTree>
+      <p:nvGrpSpPr>
+        <p:cNvPr id="1" name=""/>
+        <p:cNvGrpSpPr/>
+        <p:nvPr/>
+      </p:nvGrpSpPr>
+      <p:grpSpPr>
+        <a:xfrm>
+          <a:off x="0" y="0"/>
+          <a:ext cx="0" cy="0"/>
+          <a:chOff x="0" y="0"/>
+          <a:chExt cx="0" cy="0"/>
+        </a:xfrm>
+      </p:grpSpPr>
+      <p:sp>
+        <p:nvSpPr>
+          <p:cNvPr id="2" name="Title 1"/>
+          <p:cNvSpPr>
+            <a:spLocks noGrp="1"/>
+          </p:cNvSpPr>
+          <p:nvPr>
+            <p:ph type="title"/>
+          </p:nvPr>
+        </p:nvSpPr>
+        <p:spPr/>
+        <p:txBody>
+          <a:bodyPr>
+            <a:normAutofit/>
+          </a:bodyPr>
+          <a:lstStyle/>
+          <a:p>
+            <a:pPr lvl="0"/>
+            <a:r>
+              <a:rPr lang="en-US" b="1" u="sng" dirty="0" smtClean="0"/>
+              <a:t>1. </a:t>
+            </a:r>
+            <a:r>
+              <a:rPr lang="en-US" b="1" u="sng" dirty="0" err="1" smtClean="0"/>
+              <a:t>AnTuTu</a:t>
+            </a:r>
+            <a:r>
+              <a:rPr lang="en-US" b="1" u="sng" dirty="0" smtClean="0"/>
+              <a:t> </a:t>
+            </a:r>
+            <a:r>
+              <a:rPr lang="en-US" b="1" u="sng" dirty="0"/>
+              <a:t>Benchmark </a:t>
+            </a:r>
+            <a:endParaRPr lang="en-US" dirty="0"/>
+          </a:p>
+        </p:txBody>
+      </p:sp>
+      <p:sp>
+        <p:nvSpPr>
+          <p:cNvPr id="3" name="Content Placeholder 2"/>
+          <p:cNvSpPr>
+            <a:spLocks noGrp="1"/>
+          </p:cNvSpPr>
+          <p:nvPr>
+            <p:ph sz="half" idx="1"/>
+          </p:nvPr>
+        </p:nvSpPr>
+        <p:spPr>
+          <a:xfrm>
+            <a:off x="457200" y="1600200"/>
+            <a:ext cx="4038600" cy="4525963"/>
+          </a:xfrm>
+        </p:spPr>
+        <p:txBody>
+          <a:bodyPr>
+            <a:normAutofit/>
+          </a:bodyPr>
+          <a:lstStyle/>
+          <a:p>
+            <a:r>
+              <a:rPr lang="en-US" sz="2400" dirty="0" smtClean="0"/>
+              <a:t>Runs </a:t>
+            </a:r>
+            <a:r>
+              <a:rPr lang="en-US" sz="2400" dirty="0"/>
+              <a:t>tests on the following parts</a:t>
+            </a:r>
+          </a:p>
+          <a:p>
+            <a:pPr lvl="1"/>
+            <a:r>
+              <a:rPr lang="en-US" sz="2000" dirty="0"/>
+              <a:t>Memory Performance </a:t>
+            </a:r>
+          </a:p>
+          <a:p>
+            <a:pPr lvl="1"/>
+            <a:r>
+              <a:rPr lang="en-US" sz="2000" dirty="0"/>
+              <a:t>CPU Integer Performance</a:t>
+            </a:r>
+          </a:p>
+          <a:p>
+            <a:pPr lvl="1"/>
+            <a:r>
+              <a:rPr lang="en-US" sz="2000" dirty="0"/>
+              <a:t>CPU Floating point Performance</a:t>
+            </a:r>
+          </a:p>
+          <a:p>
+            <a:pPr lvl="1"/>
+            <a:r>
+              <a:rPr lang="en-US" sz="2000" dirty="0"/>
+              <a:t>2D Graphics Performance</a:t>
+            </a:r>
+          </a:p>
+          <a:p>
+            <a:pPr lvl="1"/>
+            <a:r>
+              <a:rPr lang="en-US" sz="2000" dirty="0"/>
+              <a:t>3D Graphics Performance</a:t>
+            </a:r>
+          </a:p>
+          <a:p>
+            <a:pPr lvl="1"/>
+            <a:r>
+              <a:rPr lang="en-US" sz="2000" dirty="0"/>
+              <a:t>SD card reading/writing speed</a:t>
+            </a:r>
+          </a:p>
+          <a:p>
+            <a:pPr lvl="1"/>
+            <a:r>
+              <a:rPr lang="en-US" sz="2000" dirty="0"/>
+              <a:t>Database IO performance </a:t>
+            </a:r>
+            <a:r>
+              <a:rPr lang="en-US" sz="2000" dirty="0" smtClean="0"/>
+              <a:t>testing</a:t>
+            </a:r>
+            <a:endParaRPr lang="en-US" sz="2000" dirty="0"/>
+          </a:p>
+        </p:txBody>
+      </p:sp>
+      <p:sp>
+        <p:nvSpPr>
+          <p:cNvPr id="5" name="Content Placeholder 4"/>
+          <p:cNvSpPr>
+            <a:spLocks noGrp="1"/>
+          </p:cNvSpPr>
+          <p:nvPr>
+            <p:ph sz="half" idx="2"/>
+          </p:nvPr>
+        </p:nvSpPr>
+        <p:spPr/>
+        <p:txBody>
+          <a:bodyPr>
+            <a:normAutofit/>
+          </a:bodyPr>
+          <a:lstStyle/>
+          <a:p>
+            <a:pPr marL="0" indent="0">
+              <a:buNone/>
+            </a:pPr>
+            <a:endParaRPr lang="en-US" dirty="0"/>
+          </a:p>
+        </p:txBody>
+      </p:sp>
+      <p:pic>
+        <p:nvPicPr>
+          <p:cNvPr id="4" name="Picture 3"/>
+          <p:cNvPicPr>
+            <a:picLocks noChangeAspect="1"/>
+          </p:cNvPicPr>
+          <p:nvPr/>
+        </p:nvPicPr>
+        <p:blipFill rotWithShape="1">
+          <a:blip r:embed="rId2">
+            <a:extLst>
+              <a:ext uri="{28A0092B-C50C-407E-A947-70E740481C1C}">
+                <a14:useLocalDpi xmlns:a14="http://schemas.microsoft.com/office/drawing/2010/main" val="0"/>
+              </a:ext>
+            </a:extLst>
+          </a:blip>
+          <a:srcRect t="4038"/>
+          <a:stretch/>
+        </p:blipFill>
+        <p:spPr>
+          <a:xfrm>
+            <a:off x="4648200" y="1960418"/>
+            <a:ext cx="2133600" cy="3338955"/>
+          </a:xfrm>
+          <a:prstGeom prst="rect">
+            <a:avLst/>
+          </a:prstGeom>
+        </p:spPr>
+      </p:pic>
+      <p:pic>
+        <p:nvPicPr>
+          <p:cNvPr id="6" name="Picture 5"/>
+          <p:cNvPicPr>
+            <a:picLocks noChangeAspect="1"/>
+          </p:cNvPicPr>
+          <p:nvPr/>
+        </p:nvPicPr>
+        <p:blipFill rotWithShape="1">
+          <a:blip r:embed="rId3">
+            <a:extLst>
+              <a:ext uri="{28A0092B-C50C-407E-A947-70E740481C1C}">
+                <a14:useLocalDpi xmlns:a14="http://schemas.microsoft.com/office/drawing/2010/main" val="0"/>
+              </a:ext>
+            </a:extLst>
+          </a:blip>
+          <a:srcRect t="4578" b="9804"/>
+          <a:stretch/>
+        </p:blipFill>
+        <p:spPr>
+          <a:xfrm>
+            <a:off x="6988869" y="1946562"/>
+            <a:ext cx="1926529" cy="3338956"/>
+          </a:xfrm>
+          <a:prstGeom prst="rect">
+            <a:avLst/>
+          </a:prstGeom>
+        </p:spPr>
+      </p:pic>
+      <p:pic>
+        <p:nvPicPr>
+          <p:cNvPr id="7" name="Picture 6"/>
+          <p:cNvPicPr>
+            <a:picLocks noChangeAspect="1"/>
+          </p:cNvPicPr>
+          <p:nvPr/>
+        </p:nvPicPr>
+        <p:blipFill>
+          <a:blip r:embed="rId4">
+            <a:extLst>
+              <a:ext uri="{28A0092B-C50C-407E-A947-70E740481C1C}">
+                <a14:useLocalDpi xmlns:a14="http://schemas.microsoft.com/office/drawing/2010/main" val="0"/>
+              </a:ext>
+            </a:extLst>
+          </a:blip>
+          <a:stretch>
+            <a:fillRect/>
+          </a:stretch>
+        </p:blipFill>
+        <p:spPr>
+          <a:xfrm>
+            <a:off x="7043437" y="533400"/>
+            <a:ext cx="742950" cy="742950"/>
+          </a:xfrm>
+          <a:prstGeom prst="rect">
+            <a:avLst/>
+          </a:prstGeom>
+        </p:spPr>
+      </p:pic>
+    </p:spTree>
+    <p:extLst>
+      <p:ext uri="{BB962C8B-B14F-4D97-AF65-F5344CB8AC3E}">
+        <p14:creationId xmlns:p14="http://schemas.microsoft.com/office/powerpoint/2010/main" val="2206322671"/>
+      </p:ext>
+    </p:extLst>
+  </p:cSld>
+  <p:clrMapOvr>
+    <a:masterClrMapping/>
+  </p:clrMapOvr>
+  <p:timing>
+    <p:tnLst>
+      <p:par>
+        <p:cTn id="1" dur="indefinite" restart="never" nodeType="tmRoot"/>
+      </p:par>
+    </p:tnLst>
+  </p:timing>
+</p:sld>
+</file>
+
+<file path=ppt/slides/slide5.xml><?xml version="1.0" encoding="utf-8"?>
+<p:sld xmlns:a="http://schemas.openxmlformats.org/drawingml/2006/main" xmlns:r="http://schemas.openxmlformats.org/officeDocument/2006/relationships" xmlns:p="http://schemas.openxmlformats.org/presentationml/2006/main">
+  <p:cSld>
+    <p:spTree>
+      <p:nvGrpSpPr>
+        <p:cNvPr id="1" name=""/>
+        <p:cNvGrpSpPr/>
+        <p:nvPr/>
+      </p:nvGrpSpPr>
+      <p:grpSpPr>
+        <a:xfrm>
+          <a:off x="0" y="0"/>
+          <a:ext cx="0" cy="0"/>
+          <a:chOff x="0" y="0"/>
+          <a:chExt cx="0" cy="0"/>
+        </a:xfrm>
+      </p:grpSpPr>
+      <p:sp>
+        <p:nvSpPr>
+          <p:cNvPr id="2" name="Title 1"/>
+          <p:cNvSpPr>
+            <a:spLocks noGrp="1"/>
+          </p:cNvSpPr>
+          <p:nvPr>
+            <p:ph type="title"/>
+          </p:nvPr>
+        </p:nvSpPr>
+        <p:spPr/>
+        <p:txBody>
+          <a:bodyPr>
+            <a:normAutofit/>
+          </a:bodyPr>
+          <a:lstStyle/>
+          <a:p>
+            <a:r>
+              <a:rPr lang="en-US" sz="3200" b="1" u="sng" dirty="0" err="1" smtClean="0"/>
+              <a:t>AnTuTu</a:t>
+            </a:r>
+            <a:r>
+              <a:rPr lang="en-US" sz="3200" b="1" u="sng" dirty="0" smtClean="0"/>
+              <a:t> Benchmark  VS Quadrant</a:t>
+            </a:r>
+            <a:endParaRPr lang="en-US" sz="3200" dirty="0"/>
+          </a:p>
+        </p:txBody>
+      </p:sp>
+      <p:sp>
+        <p:nvSpPr>
+          <p:cNvPr id="3" name="Content Placeholder 2"/>
+          <p:cNvSpPr>
+            <a:spLocks noGrp="1"/>
+          </p:cNvSpPr>
+          <p:nvPr>
+            <p:ph idx="1"/>
+          </p:nvPr>
+        </p:nvSpPr>
+        <p:spPr/>
+        <p:txBody>
+          <a:bodyPr>
+            <a:normAutofit lnSpcReduction="10000"/>
+          </a:bodyPr>
+          <a:lstStyle/>
+          <a:p>
+            <a:r>
+              <a:rPr lang="en-US" sz="2400" dirty="0" smtClean="0"/>
+              <a:t>Quadrant is a popular android application similar to </a:t>
+            </a:r>
+            <a:r>
+              <a:rPr lang="en-US" sz="2400" dirty="0" err="1" smtClean="0"/>
+              <a:t>AnTuTu</a:t>
+            </a:r>
+            <a:r>
+              <a:rPr lang="en-US" sz="2400" dirty="0" smtClean="0"/>
+              <a:t> Benchmark, it also performs </a:t>
+            </a:r>
+            <a:r>
+              <a:rPr lang="en-US" sz="2400" dirty="0"/>
+              <a:t>tests on CPU, Memory, I/O and 2D and 3D graphics performance </a:t>
+            </a:r>
+          </a:p>
+          <a:p>
+            <a:pPr marL="0" indent="0">
+              <a:buNone/>
+            </a:pPr>
+            <a:endParaRPr lang="en-US" sz="2400" dirty="0" smtClean="0"/>
+          </a:p>
+          <a:p>
+            <a:r>
+              <a:rPr lang="en-US" sz="2400" dirty="0" err="1" smtClean="0"/>
+              <a:t>AnTuTu</a:t>
+            </a:r>
+            <a:r>
+              <a:rPr lang="en-US" sz="2400" dirty="0" smtClean="0"/>
+              <a:t> Benchmark allows both full benchmark test and custom benchmark test, that is user can choose to test on certain parts of the device. </a:t>
+            </a:r>
+          </a:p>
+          <a:p>
+            <a:endParaRPr lang="en-US" sz="2400" dirty="0" smtClean="0"/>
+          </a:p>
+          <a:p>
+            <a:r>
+              <a:rPr lang="en-US" sz="2400" dirty="0" smtClean="0"/>
+              <a:t>Quadrant  </a:t>
+            </a:r>
+            <a:r>
+              <a:rPr lang="en-US" sz="2400" dirty="0"/>
+              <a:t>Standard Edition only allows full benchmark test,   custom test is only </a:t>
+            </a:r>
+            <a:r>
+              <a:rPr lang="en-US" sz="2400" dirty="0" err="1" smtClean="0"/>
+              <a:t>avaiable</a:t>
+            </a:r>
+            <a:r>
+              <a:rPr lang="en-US" sz="2400" dirty="0" smtClean="0"/>
+              <a:t> in </a:t>
+            </a:r>
+            <a:r>
+              <a:rPr lang="en-US" sz="2400" dirty="0"/>
+              <a:t>the </a:t>
+            </a:r>
+            <a:r>
+              <a:rPr lang="en-US" sz="2400" dirty="0" smtClean="0"/>
+              <a:t>advanced edition</a:t>
+            </a:r>
+            <a:endParaRPr lang="en-US" sz="2400" dirty="0"/>
+          </a:p>
+          <a:p>
+            <a:pPr marL="0" indent="0">
+              <a:buNone/>
+            </a:pPr>
+            <a:endParaRPr lang="en-US" sz="2400" dirty="0"/>
+          </a:p>
+          <a:p>
+            <a:r>
+              <a:rPr lang="en-US" sz="2400" dirty="0" err="1"/>
+              <a:t>AnTuTu</a:t>
+            </a:r>
+            <a:r>
+              <a:rPr lang="en-US" sz="2400" dirty="0"/>
+              <a:t> can finish the full benchmark test within 5 </a:t>
+            </a:r>
+            <a:r>
+              <a:rPr lang="en-US" sz="2400" dirty="0" smtClean="0"/>
+              <a:t>minutes</a:t>
+            </a:r>
+          </a:p>
+        </p:txBody>
+      </p:sp>
+    </p:spTree>
+    <p:extLst>
+      <p:ext uri="{BB962C8B-B14F-4D97-AF65-F5344CB8AC3E}">
+        <p14:creationId xmlns:p14="http://schemas.microsoft.com/office/powerpoint/2010/main" val="1445709920"/>
+      </p:ext>
+    </p:extLst>
+  </p:cSld>
+  <p:clrMapOvr>
+    <a:masterClrMapping/>
+  </p:clrMapOvr>
+  <p:timing>
+    <p:tnLst>
+      <p:par>
+        <p:cTn id="1" dur="indefinite" restart="never" nodeType="tmRoot"/>
+      </p:par>
+    </p:tnLst>
+  </p:timing>
+</p:sld>
+</file>
+
+<file path=ppt/slides/slide6.xml><?xml version="1.0" encoding="utf-8"?>
+<p:sld xmlns:a="http://schemas.openxmlformats.org/drawingml/2006/main" xmlns:r="http://schemas.openxmlformats.org/officeDocument/2006/relationships" xmlns:p="http://schemas.openxmlformats.org/presentationml/2006/main">
+  <p:cSld>
+    <p:spTree>
+      <p:nvGrpSpPr>
+        <p:cNvPr id="1" name=""/>
+        <p:cNvGrpSpPr/>
+        <p:nvPr/>
+      </p:nvGrpSpPr>
+      <p:grpSpPr>
+        <a:xfrm>
+          <a:off x="0" y="0"/>
+          <a:ext cx="0" cy="0"/>
+          <a:chOff x="0" y="0"/>
+          <a:chExt cx="0" cy="0"/>
+        </a:xfrm>
+      </p:grpSpPr>
+      <p:sp>
+        <p:nvSpPr>
+          <p:cNvPr id="2" name="Title 1"/>
+          <p:cNvSpPr>
+            <a:spLocks noGrp="1"/>
+          </p:cNvSpPr>
+          <p:nvPr>
+            <p:ph type="title"/>
+          </p:nvPr>
+        </p:nvSpPr>
+        <p:spPr>
+          <a:xfrm>
+            <a:off x="152400" y="152400"/>
+            <a:ext cx="8229600" cy="1143000"/>
+          </a:xfrm>
+        </p:spPr>
+        <p:txBody>
+          <a:bodyPr>
+            <a:normAutofit/>
+          </a:bodyPr>
+          <a:lstStyle/>
+          <a:p>
+            <a:pPr lvl="0"/>
+            <a:r>
+              <a:rPr lang="en-US" b="1" u="sng" dirty="0" smtClean="0"/>
+              <a:t>2. </a:t>
+            </a:r>
+            <a:r>
+              <a:rPr lang="en-US" b="1" u="sng" dirty="0" err="1" smtClean="0"/>
+              <a:t>Vellamo</a:t>
+            </a:r>
+            <a:r>
+              <a:rPr lang="en-US" b="1" u="sng" dirty="0" smtClean="0"/>
+              <a:t> </a:t>
+            </a:r>
+            <a:r>
+              <a:rPr lang="en-US" b="1" u="sng" dirty="0"/>
+              <a:t>Mobile Web </a:t>
+            </a:r>
+            <a:r>
+              <a:rPr lang="en-US" b="1" u="sng" dirty="0" smtClean="0"/>
+              <a:t>Benchmark</a:t>
+            </a:r>
+            <a:endParaRPr lang="en-US" dirty="0"/>
+          </a:p>
+        </p:txBody>
+      </p:sp>
+      <p:sp>
+        <p:nvSpPr>
+          <p:cNvPr id="3" name="Content Placeholder 2"/>
+          <p:cNvSpPr>
+            <a:spLocks noGrp="1"/>
+          </p:cNvSpPr>
+          <p:nvPr>
+            <p:ph idx="1"/>
+          </p:nvPr>
+        </p:nvSpPr>
+        <p:spPr>
+          <a:xfrm>
+            <a:off x="457200" y="1200150"/>
+            <a:ext cx="5334000" cy="5257800"/>
+          </a:xfrm>
+        </p:spPr>
+        <p:txBody>
+          <a:bodyPr>
+            <a:normAutofit lnSpcReduction="10000"/>
+          </a:bodyPr>
+          <a:lstStyle/>
+          <a:p>
+            <a:r>
+              <a:rPr lang="en-US" sz="2000" dirty="0"/>
+              <a:t>Measures the following things</a:t>
+            </a:r>
+          </a:p>
+          <a:p>
+            <a:pPr lvl="1"/>
+            <a:r>
+              <a:rPr lang="en-US" sz="1600" dirty="0"/>
+              <a:t>the browser’s use of the HTML5 display processing subsystem</a:t>
+            </a:r>
+          </a:p>
+          <a:p>
+            <a:pPr lvl="1"/>
+            <a:r>
+              <a:rPr lang="en-US" sz="1600" dirty="0"/>
+              <a:t>overall speed and efficiency of the JavaScript virtual machine</a:t>
+            </a:r>
+          </a:p>
+          <a:p>
+            <a:pPr lvl="1"/>
+            <a:r>
+              <a:rPr lang="en-US" sz="1600" dirty="0"/>
+              <a:t>the efficiency between this engine and the core browser</a:t>
+            </a:r>
+          </a:p>
+          <a:p>
+            <a:pPr lvl="1"/>
+            <a:r>
+              <a:rPr lang="en-US" sz="1600" dirty="0"/>
+              <a:t>responsiveness of panning, zooming, and scrolling of text, images, and standard web page objects</a:t>
+            </a:r>
+          </a:p>
+          <a:p>
+            <a:pPr lvl="1"/>
+            <a:r>
+              <a:rPr lang="en-US" sz="1600" dirty="0"/>
+              <a:t>the performance of the browser’s HTTP and IP networking </a:t>
+            </a:r>
+            <a:r>
+              <a:rPr lang="en-US" sz="1600" dirty="0" smtClean="0"/>
+              <a:t>stack</a:t>
+            </a:r>
+          </a:p>
+          <a:p>
+            <a:pPr marL="342900" lvl="1" indent="-342900">
+              <a:buFont typeface="Arial" pitchFamily="34" charset="0"/>
+              <a:buChar char="•"/>
+            </a:pPr>
+            <a:r>
+              <a:rPr lang="en-US" sz="2000" dirty="0"/>
+              <a:t>Can be used to benchmark different android device if the same browser is being used on </a:t>
+            </a:r>
+            <a:r>
+              <a:rPr lang="en-US" sz="2000" dirty="0" smtClean="0"/>
+              <a:t>each</a:t>
+            </a:r>
+            <a:endParaRPr lang="en-US" sz="1800" dirty="0" smtClean="0"/>
+          </a:p>
+          <a:p>
+            <a:pPr marL="342900" lvl="1" indent="-342900">
+              <a:buFont typeface="Arial" pitchFamily="34" charset="0"/>
+              <a:buChar char="•"/>
+            </a:pPr>
+            <a:r>
+              <a:rPr lang="en-US" sz="2000" dirty="0"/>
+              <a:t>Reasons for choosing this </a:t>
+            </a:r>
+            <a:r>
+              <a:rPr lang="en-US" sz="2000" dirty="0" smtClean="0"/>
+              <a:t>application instead of other browser benchmark:</a:t>
+            </a:r>
+            <a:endParaRPr lang="en-US" sz="2000" dirty="0"/>
+          </a:p>
+          <a:p>
+            <a:pPr lvl="1"/>
+            <a:r>
+              <a:rPr lang="en-US" sz="1600" dirty="0"/>
+              <a:t>High user rating </a:t>
+            </a:r>
+            <a:r>
+              <a:rPr lang="en-US" sz="1600" dirty="0" smtClean="0"/>
+              <a:t>in </a:t>
+            </a:r>
+            <a:r>
+              <a:rPr lang="en-US" sz="1600" dirty="0" err="1" smtClean="0"/>
+              <a:t>google</a:t>
+            </a:r>
+            <a:r>
+              <a:rPr lang="en-US" sz="1600" dirty="0" smtClean="0"/>
+              <a:t> </a:t>
+            </a:r>
+            <a:r>
+              <a:rPr lang="en-US" sz="1600" dirty="0"/>
+              <a:t>play </a:t>
+            </a:r>
+            <a:r>
+              <a:rPr lang="en-US" sz="1600" dirty="0" smtClean="0"/>
+              <a:t>store </a:t>
+            </a:r>
+          </a:p>
+          <a:p>
+            <a:pPr marL="400050" lvl="1" indent="0">
+              <a:buNone/>
+            </a:pPr>
+            <a:r>
+              <a:rPr lang="en-US" sz="1600" dirty="0"/>
+              <a:t> </a:t>
+            </a:r>
+            <a:r>
+              <a:rPr lang="en-US" sz="1200" dirty="0" smtClean="0"/>
+              <a:t>      (average rating : 4.3 / 5)</a:t>
+            </a:r>
+          </a:p>
+        </p:txBody>
+      </p:sp>
+      <p:pic>
+        <p:nvPicPr>
+          <p:cNvPr id="4" name="Picture 3"/>
+          <p:cNvPicPr>
+            <a:picLocks noChangeAspect="1"/>
+          </p:cNvPicPr>
+          <p:nvPr/>
+        </p:nvPicPr>
+        <p:blipFill>
+          <a:blip r:embed="rId3">
+            <a:extLst>
+              <a:ext uri="{28A0092B-C50C-407E-A947-70E740481C1C}">
+                <a14:useLocalDpi xmlns:a14="http://schemas.microsoft.com/office/drawing/2010/main" val="0"/>
+              </a:ext>
+            </a:extLst>
+          </a:blip>
+          <a:stretch>
+            <a:fillRect/>
+          </a:stretch>
+        </p:blipFill>
+        <p:spPr>
+          <a:xfrm>
+            <a:off x="5943600" y="1447800"/>
+            <a:ext cx="2924175" cy="4876800"/>
+          </a:xfrm>
+          <a:prstGeom prst="rect">
+            <a:avLst/>
+          </a:prstGeom>
+        </p:spPr>
+      </p:pic>
+      <p:pic>
+        <p:nvPicPr>
+          <p:cNvPr id="5" name="Picture 4"/>
+          <p:cNvPicPr>
+            <a:picLocks noChangeAspect="1"/>
+          </p:cNvPicPr>
+          <p:nvPr/>
+        </p:nvPicPr>
+        <p:blipFill>
+          <a:blip r:embed="rId4">
+            <a:extLst>
+              <a:ext uri="{28A0092B-C50C-407E-A947-70E740481C1C}">
+                <a14:useLocalDpi xmlns:a14="http://schemas.microsoft.com/office/drawing/2010/main" val="0"/>
+              </a:ext>
+            </a:extLst>
+          </a:blip>
+          <a:stretch>
+            <a:fillRect/>
+          </a:stretch>
+        </p:blipFill>
+        <p:spPr>
+          <a:xfrm>
+            <a:off x="7497907" y="371475"/>
+            <a:ext cx="742950" cy="742950"/>
+          </a:xfrm>
+          <a:prstGeom prst="rect">
+            <a:avLst/>
+          </a:prstGeom>
+        </p:spPr>
+      </p:pic>
+    </p:spTree>
+    <p:extLst>
+      <p:ext uri="{BB962C8B-B14F-4D97-AF65-F5344CB8AC3E}">
+        <p14:creationId xmlns:p14="http://schemas.microsoft.com/office/powerpoint/2010/main" val="685361917"/>
+      </p:ext>
+    </p:extLst>
+  </p:cSld>
+  <p:clrMapOvr>
+    <a:masterClrMapping/>
+  </p:clrMapOvr>
+  <p:timing>
+    <p:tnLst>
+      <p:par>
+        <p:cTn id="1" dur="indefinite" restart="never" nodeType="tmRoot"/>
+      </p:par>
+    </p:tnLst>
+  </p:timing>
+</p:sld>
+</file>
+
+<file path=ppt/slides/slide7.xml><?xml version="1.0" encoding="utf-8"?>
+<p:sld xmlns:a="http://schemas.openxmlformats.org/drawingml/2006/main" xmlns:r="http://schemas.openxmlformats.org/officeDocument/2006/relationships" xmlns:p="http://schemas.openxmlformats.org/presentationml/2006/main">
+  <p:cSld>
+    <p:spTree>
+      <p:nvGrpSpPr>
+        <p:cNvPr id="1" name=""/>
+        <p:cNvGrpSpPr/>
+        <p:nvPr/>
+      </p:nvGrpSpPr>
+      <p:grpSpPr>
+        <a:xfrm>
+          <a:off x="0" y="0"/>
+          <a:ext cx="0" cy="0"/>
+          <a:chOff x="0" y="0"/>
+          <a:chExt cx="0" cy="0"/>
+        </a:xfrm>
+      </p:grpSpPr>
+      <p:sp>
+        <p:nvSpPr>
+          <p:cNvPr id="2" name="Title 1"/>
+          <p:cNvSpPr>
+            <a:spLocks noGrp="1"/>
+          </p:cNvSpPr>
+          <p:nvPr>
+            <p:ph type="title"/>
+          </p:nvPr>
+        </p:nvSpPr>
+        <p:spPr/>
+        <p:txBody>
+          <a:bodyPr/>
+          <a:lstStyle/>
+          <a:p>
+            <a:r>
+              <a:rPr lang="en-US" b="1" u="sng" dirty="0" smtClean="0"/>
+              <a:t>3. </a:t>
+            </a:r>
+            <a:r>
+              <a:rPr lang="en-US" b="1" u="sng" dirty="0" err="1" smtClean="0"/>
+              <a:t>GlBenchmark</a:t>
+            </a:r>
+            <a:endParaRPr lang="en-US" dirty="0"/>
+          </a:p>
+        </p:txBody>
+      </p:sp>
+      <p:sp>
+        <p:nvSpPr>
+          <p:cNvPr id="4" name="Content Placeholder 3"/>
+          <p:cNvSpPr>
+            <a:spLocks noGrp="1"/>
+          </p:cNvSpPr>
+          <p:nvPr>
+            <p:ph sz="half" idx="1"/>
           </p:nvPr>
         </p:nvSpPr>
         <p:spPr/>
@@ -8398,6 +9957,257 @@
           <a:lstStyle/>
           <a:p>
             <a:r>
+              <a:rPr lang="en-US" dirty="0"/>
+              <a:t>gives more accurate 3D Graphics Performance measurement, it contains testing with high level 3D animation</a:t>
+            </a:r>
+            <a:r>
+              <a:rPr lang="en-US" dirty="0" smtClean="0"/>
+              <a:t>.</a:t>
+            </a:r>
+            <a:endParaRPr lang="en-US" dirty="0"/>
+          </a:p>
+          <a:p>
+            <a:r>
+              <a:rPr lang="en-US" dirty="0" smtClean="0"/>
+              <a:t>Reasons for choosing this application:</a:t>
+            </a:r>
+          </a:p>
+          <a:p>
+            <a:pPr lvl="1"/>
+            <a:r>
+              <a:rPr lang="en-US" dirty="0"/>
+              <a:t>Contains many </a:t>
+            </a:r>
+            <a:r>
+              <a:rPr lang="en-US" dirty="0" smtClean="0"/>
+              <a:t>different</a:t>
+            </a:r>
+            <a:r>
+              <a:rPr lang="en-US" baseline="0" dirty="0" smtClean="0"/>
+              <a:t> </a:t>
+            </a:r>
+            <a:r>
+              <a:rPr lang="en-US" dirty="0" smtClean="0"/>
+              <a:t>performance </a:t>
+            </a:r>
+            <a:r>
+              <a:rPr lang="en-US" dirty="0"/>
+              <a:t>tests on </a:t>
+            </a:r>
+            <a:r>
+              <a:rPr lang="en-US" dirty="0" smtClean="0"/>
+              <a:t>graphic  </a:t>
+            </a:r>
+            <a:r>
+              <a:rPr lang="en-US" dirty="0"/>
+              <a:t>(33 different tests)</a:t>
+            </a:r>
+          </a:p>
+          <a:p>
+            <a:pPr lvl="1"/>
+            <a:r>
+              <a:rPr lang="en-US" dirty="0"/>
+              <a:t>Flexible selection of </a:t>
+            </a:r>
+            <a:r>
+              <a:rPr lang="en-US" dirty="0" smtClean="0"/>
+              <a:t>test</a:t>
+            </a:r>
+            <a:endParaRPr lang="en-US" dirty="0"/>
+          </a:p>
+        </p:txBody>
+      </p:sp>
+      <p:sp>
+        <p:nvSpPr>
+          <p:cNvPr id="5" name="Content Placeholder 4"/>
+          <p:cNvSpPr>
+            <a:spLocks noGrp="1"/>
+          </p:cNvSpPr>
+          <p:nvPr>
+            <p:ph sz="half" idx="2"/>
+          </p:nvPr>
+        </p:nvSpPr>
+        <p:spPr/>
+        <p:txBody>
+          <a:bodyPr>
+            <a:normAutofit fontScale="92500"/>
+          </a:bodyPr>
+          <a:lstStyle/>
+          <a:p>
+            <a:endParaRPr lang="en-US" dirty="0"/>
+          </a:p>
+        </p:txBody>
+      </p:sp>
+      <p:pic>
+        <p:nvPicPr>
+          <p:cNvPr id="6" name="Picture 5"/>
+          <p:cNvPicPr>
+            <a:picLocks noChangeAspect="1"/>
+          </p:cNvPicPr>
+          <p:nvPr/>
+        </p:nvPicPr>
+        <p:blipFill>
+          <a:blip r:embed="rId2">
+            <a:extLst>
+              <a:ext uri="{28A0092B-C50C-407E-A947-70E740481C1C}">
+                <a14:useLocalDpi xmlns:a14="http://schemas.microsoft.com/office/drawing/2010/main" val="0"/>
+              </a:ext>
+            </a:extLst>
+          </a:blip>
+          <a:stretch>
+            <a:fillRect/>
+          </a:stretch>
+        </p:blipFill>
+        <p:spPr>
+          <a:xfrm>
+            <a:off x="6410325" y="533400"/>
+            <a:ext cx="742950" cy="742950"/>
+          </a:xfrm>
+          <a:prstGeom prst="rect">
+            <a:avLst/>
+          </a:prstGeom>
+        </p:spPr>
+      </p:pic>
+      <p:pic>
+        <p:nvPicPr>
+          <p:cNvPr id="10" name="Picture 9"/>
+          <p:cNvPicPr>
+            <a:picLocks noChangeAspect="1"/>
+          </p:cNvPicPr>
+          <p:nvPr/>
+        </p:nvPicPr>
+        <p:blipFill>
+          <a:blip r:embed="rId3">
+            <a:extLst>
+              <a:ext uri="{28A0092B-C50C-407E-A947-70E740481C1C}">
+                <a14:useLocalDpi xmlns:a14="http://schemas.microsoft.com/office/drawing/2010/main" val="0"/>
+              </a:ext>
+            </a:extLst>
+          </a:blip>
+          <a:stretch>
+            <a:fillRect/>
+          </a:stretch>
+        </p:blipFill>
+        <p:spPr>
+          <a:xfrm>
+            <a:off x="4479050" y="2093348"/>
+            <a:ext cx="2113172" cy="3338518"/>
+          </a:xfrm>
+          <a:prstGeom prst="rect">
+            <a:avLst/>
+          </a:prstGeom>
+        </p:spPr>
+      </p:pic>
+      <p:pic>
+        <p:nvPicPr>
+          <p:cNvPr id="11" name="Picture 10"/>
+          <p:cNvPicPr>
+            <a:picLocks noChangeAspect="1"/>
+          </p:cNvPicPr>
+          <p:nvPr/>
+        </p:nvPicPr>
+        <p:blipFill>
+          <a:blip r:embed="rId4">
+            <a:extLst>
+              <a:ext uri="{28A0092B-C50C-407E-A947-70E740481C1C}">
+                <a14:useLocalDpi xmlns:a14="http://schemas.microsoft.com/office/drawing/2010/main" val="0"/>
+              </a:ext>
+            </a:extLst>
+          </a:blip>
+          <a:stretch>
+            <a:fillRect/>
+          </a:stretch>
+        </p:blipFill>
+        <p:spPr>
+          <a:xfrm>
+            <a:off x="6781799" y="2093347"/>
+            <a:ext cx="2057401" cy="3338519"/>
+          </a:xfrm>
+          <a:prstGeom prst="rect">
+            <a:avLst/>
+          </a:prstGeom>
+        </p:spPr>
+      </p:pic>
+    </p:spTree>
+    <p:extLst>
+      <p:ext uri="{BB962C8B-B14F-4D97-AF65-F5344CB8AC3E}">
+        <p14:creationId xmlns:p14="http://schemas.microsoft.com/office/powerpoint/2010/main" val="14829009"/>
+      </p:ext>
+    </p:extLst>
+  </p:cSld>
+  <p:clrMapOvr>
+    <a:masterClrMapping/>
+  </p:clrMapOvr>
+  <p:timing>
+    <p:tnLst>
+      <p:par>
+        <p:cTn id="1" dur="indefinite" restart="never" nodeType="tmRoot"/>
+      </p:par>
+    </p:tnLst>
+  </p:timing>
+</p:sld>
+</file>
+
+<file path=ppt/slides/slide8.xml><?xml version="1.0" encoding="utf-8"?>
+<p:sld xmlns:a="http://schemas.openxmlformats.org/drawingml/2006/main" xmlns:r="http://schemas.openxmlformats.org/officeDocument/2006/relationships" xmlns:p="http://schemas.openxmlformats.org/presentationml/2006/main">
+  <p:cSld>
+    <p:spTree>
+      <p:nvGrpSpPr>
+        <p:cNvPr id="1" name=""/>
+        <p:cNvGrpSpPr/>
+        <p:nvPr/>
+      </p:nvGrpSpPr>
+      <p:grpSpPr>
+        <a:xfrm>
+          <a:off x="0" y="0"/>
+          <a:ext cx="0" cy="0"/>
+          <a:chOff x="0" y="0"/>
+          <a:chExt cx="0" cy="0"/>
+        </a:xfrm>
+      </p:grpSpPr>
+      <p:sp>
+        <p:nvSpPr>
+          <p:cNvPr id="2" name="Title 1"/>
+          <p:cNvSpPr>
+            <a:spLocks noGrp="1"/>
+          </p:cNvSpPr>
+          <p:nvPr>
+            <p:ph type="title"/>
+          </p:nvPr>
+        </p:nvSpPr>
+        <p:spPr/>
+        <p:txBody>
+          <a:bodyPr>
+            <a:normAutofit/>
+          </a:bodyPr>
+          <a:lstStyle/>
+          <a:p>
+            <a:r>
+              <a:rPr lang="en-US" u="sng" dirty="0" smtClean="0"/>
+              <a:t>Compound index is recommended</a:t>
+            </a:r>
+            <a:endParaRPr lang="en-US" u="sng" dirty="0"/>
+          </a:p>
+        </p:txBody>
+      </p:sp>
+      <p:sp>
+        <p:nvSpPr>
+          <p:cNvPr id="3" name="Content Placeholder 2"/>
+          <p:cNvSpPr>
+            <a:spLocks noGrp="1"/>
+          </p:cNvSpPr>
+          <p:nvPr>
+            <p:ph idx="1"/>
+          </p:nvPr>
+        </p:nvSpPr>
+        <p:spPr/>
+        <p:txBody>
+          <a:bodyPr>
+            <a:normAutofit fontScale="92500"/>
+          </a:bodyPr>
+          <a:lstStyle/>
+          <a:p>
+            <a:r>
               <a:rPr lang="en-US" sz="3000" dirty="0" smtClean="0"/>
               <a:t>To rank devices using the above applications mentioned, we calculate the overall score for the devices using the following formula</a:t>
             </a:r>
@@ -8426,11 +10236,7 @@
             </a:r>
             <a:r>
               <a:rPr lang="en-US" sz="2600" b="1" dirty="0" smtClean="0"/>
-              <a:t> </a:t>
-            </a:r>
-            <a:r>
-              <a:rPr lang="en-US" sz="2600" b="1" dirty="0" smtClean="0"/>
-              <a:t>Benchmark * 80 %  +     </a:t>
+              <a:t> Benchmark * 80 %  +     </a:t>
             </a:r>
           </a:p>
           <a:p>
@@ -8504,7 +10310,7 @@
 </p:sld>
 </file>
 
-<file path=ppt/slides/slide17.xml><?xml version="1.0" encoding="utf-8"?>
+<file path=ppt/slides/slide9.xml><?xml version="1.0" encoding="utf-8"?>
 <p:sld xmlns:a="http://schemas.openxmlformats.org/drawingml/2006/main" xmlns:r="http://schemas.openxmlformats.org/officeDocument/2006/relationships" xmlns:p="http://schemas.openxmlformats.org/presentationml/2006/main">
   <p:cSld>
     <p:spTree>
@@ -9703,1736 +11509,6 @@
     <p:extLst>
       <p:ext uri="{BB962C8B-B14F-4D97-AF65-F5344CB8AC3E}">
         <p14:creationId xmlns:p14="http://schemas.microsoft.com/office/powerpoint/2010/main" val="3864081334"/>
-      </p:ext>
-    </p:extLst>
-  </p:cSld>
-  <p:clrMapOvr>
-    <a:masterClrMapping/>
-  </p:clrMapOvr>
-  <p:timing>
-    <p:tnLst>
-      <p:par>
-        <p:cTn id="1" dur="indefinite" restart="never" nodeType="tmRoot"/>
-      </p:par>
-    </p:tnLst>
-  </p:timing>
-</p:sld>
-</file>
-
-<file path=ppt/slides/slide2.xml><?xml version="1.0" encoding="utf-8"?>
-<p:sld xmlns:a="http://schemas.openxmlformats.org/drawingml/2006/main" xmlns:r="http://schemas.openxmlformats.org/officeDocument/2006/relationships" xmlns:p="http://schemas.openxmlformats.org/presentationml/2006/main">
-  <p:cSld>
-    <p:spTree>
-      <p:nvGrpSpPr>
-        <p:cNvPr id="1" name=""/>
-        <p:cNvGrpSpPr/>
-        <p:nvPr/>
-      </p:nvGrpSpPr>
-      <p:grpSpPr>
-        <a:xfrm>
-          <a:off x="0" y="0"/>
-          <a:ext cx="0" cy="0"/>
-          <a:chOff x="0" y="0"/>
-          <a:chExt cx="0" cy="0"/>
-        </a:xfrm>
-      </p:grpSpPr>
-      <p:sp>
-        <p:nvSpPr>
-          <p:cNvPr id="2" name="Title 1"/>
-          <p:cNvSpPr>
-            <a:spLocks noGrp="1"/>
-          </p:cNvSpPr>
-          <p:nvPr>
-            <p:ph type="title"/>
-          </p:nvPr>
-        </p:nvSpPr>
-        <p:spPr/>
-        <p:txBody>
-          <a:bodyPr>
-            <a:normAutofit/>
-          </a:bodyPr>
-          <a:lstStyle/>
-          <a:p>
-            <a:r>
-              <a:rPr lang="en-US" sz="4400" dirty="0" smtClean="0"/>
-              <a:t>List of Apps for benchmarking</a:t>
-            </a:r>
-            <a:endParaRPr lang="en-US" sz="4400" dirty="0"/>
-          </a:p>
-        </p:txBody>
-      </p:sp>
-      <p:sp>
-        <p:nvSpPr>
-          <p:cNvPr id="3" name="Content Placeholder 2"/>
-          <p:cNvSpPr>
-            <a:spLocks noGrp="1"/>
-          </p:cNvSpPr>
-          <p:nvPr>
-            <p:ph idx="1"/>
-          </p:nvPr>
-        </p:nvSpPr>
-        <p:spPr>
-          <a:xfrm>
-            <a:off x="457200" y="1371600"/>
-            <a:ext cx="8229600" cy="5257800"/>
-          </a:xfrm>
-        </p:spPr>
-        <p:txBody>
-          <a:bodyPr>
-            <a:normAutofit fontScale="92500" lnSpcReduction="20000"/>
-          </a:bodyPr>
-          <a:lstStyle/>
-          <a:p>
-            <a:pPr marL="514350" lvl="0" indent="-514350">
-              <a:buFont typeface="+mj-lt"/>
-              <a:buAutoNum type="arabicPeriod"/>
-            </a:pPr>
-            <a:r>
-              <a:rPr lang="en-US" dirty="0" err="1" smtClean="0"/>
-              <a:t>AnTuTu</a:t>
-            </a:r>
-            <a:r>
-              <a:rPr lang="en-US" dirty="0" smtClean="0"/>
-              <a:t> Benchmark</a:t>
-            </a:r>
-          </a:p>
-          <a:p>
-            <a:pPr marL="514350" lvl="0" indent="-514350">
-              <a:buFont typeface="+mj-lt"/>
-              <a:buAutoNum type="arabicPeriod"/>
-            </a:pPr>
-            <a:r>
-              <a:rPr lang="en-US" dirty="0" smtClean="0"/>
-              <a:t>Quadrant Standard Edition</a:t>
-            </a:r>
-          </a:p>
-          <a:p>
-            <a:pPr marL="514350" lvl="0" indent="-514350">
-              <a:buFont typeface="+mj-lt"/>
-              <a:buAutoNum type="arabicPeriod"/>
-            </a:pPr>
-            <a:r>
-              <a:rPr lang="en-US" dirty="0" err="1" smtClean="0"/>
-              <a:t>Vellamo</a:t>
-            </a:r>
-            <a:r>
-              <a:rPr lang="en-US" dirty="0" smtClean="0"/>
-              <a:t> Mobile Web Benchmark</a:t>
-            </a:r>
-          </a:p>
-          <a:p>
-            <a:pPr marL="514350" indent="-514350">
-              <a:buFont typeface="+mj-lt"/>
-              <a:buAutoNum type="arabicPeriod"/>
-            </a:pPr>
-            <a:r>
-              <a:rPr lang="en-US" dirty="0" err="1" smtClean="0"/>
-              <a:t>GlBenchmark</a:t>
-            </a:r>
-            <a:endParaRPr lang="en-US" dirty="0" smtClean="0"/>
-          </a:p>
-          <a:p>
-            <a:pPr marL="514350" indent="-514350">
-              <a:buFont typeface="+mj-lt"/>
-              <a:buAutoNum type="arabicPeriod"/>
-            </a:pPr>
-            <a:r>
-              <a:rPr lang="en-US" dirty="0" smtClean="0"/>
-              <a:t>SD Tool</a:t>
-            </a:r>
-          </a:p>
-          <a:p>
-            <a:pPr marL="514350" indent="-514350">
-              <a:buFont typeface="+mj-lt"/>
-              <a:buAutoNum type="arabicPeriod"/>
-            </a:pPr>
-            <a:r>
-              <a:rPr lang="en-US" dirty="0" smtClean="0"/>
-              <a:t>CF-Bench</a:t>
-            </a:r>
-          </a:p>
-          <a:p>
-            <a:pPr marL="514350" indent="-514350">
-              <a:buFont typeface="+mj-lt"/>
-              <a:buAutoNum type="arabicPeriod"/>
-            </a:pPr>
-            <a:r>
-              <a:rPr lang="en-US" dirty="0" err="1" smtClean="0"/>
-              <a:t>Linpack</a:t>
-            </a:r>
-            <a:r>
-              <a:rPr lang="en-US" dirty="0" smtClean="0"/>
-              <a:t> for Android</a:t>
-            </a:r>
-          </a:p>
-          <a:p>
-            <a:pPr marL="514350" indent="-514350">
-              <a:buFont typeface="+mj-lt"/>
-              <a:buAutoNum type="arabicPeriod"/>
-            </a:pPr>
-            <a:r>
-              <a:rPr lang="en-US" dirty="0" smtClean="0"/>
-              <a:t>CPU Benchmark</a:t>
-            </a:r>
-          </a:p>
-          <a:p>
-            <a:pPr marL="514350" indent="-514350">
-              <a:buFont typeface="+mj-lt"/>
-              <a:buAutoNum type="arabicPeriod"/>
-            </a:pPr>
-            <a:r>
-              <a:rPr lang="en-US" dirty="0" err="1" smtClean="0"/>
-              <a:t>RealPi</a:t>
-            </a:r>
-            <a:endParaRPr lang="en-US" dirty="0" smtClean="0"/>
-          </a:p>
-          <a:p>
-            <a:pPr marL="514350" indent="-514350">
-              <a:buFont typeface="+mj-lt"/>
-              <a:buAutoNum type="arabicPeriod"/>
-            </a:pPr>
-            <a:r>
-              <a:rPr lang="en-US" dirty="0" smtClean="0"/>
-              <a:t>NenaMark2</a:t>
-            </a:r>
-          </a:p>
-          <a:p>
-            <a:pPr marL="514350" indent="-514350">
-              <a:buFont typeface="+mj-lt"/>
-              <a:buAutoNum type="arabicPeriod"/>
-            </a:pPr>
-            <a:r>
-              <a:rPr lang="en-US" dirty="0" err="1" smtClean="0"/>
-              <a:t>Neocore</a:t>
-            </a:r>
-            <a:endParaRPr lang="en-US" dirty="0" smtClean="0"/>
-          </a:p>
-        </p:txBody>
-      </p:sp>
-    </p:spTree>
-    <p:extLst>
-      <p:ext uri="{BB962C8B-B14F-4D97-AF65-F5344CB8AC3E}">
-        <p14:creationId xmlns:p14="http://schemas.microsoft.com/office/powerpoint/2010/main" val="3715149438"/>
-      </p:ext>
-    </p:extLst>
-  </p:cSld>
-  <p:clrMapOvr>
-    <a:masterClrMapping/>
-  </p:clrMapOvr>
-  <p:timing>
-    <p:tnLst>
-      <p:par>
-        <p:cTn id="1" dur="indefinite" restart="never" nodeType="tmRoot"/>
-      </p:par>
-    </p:tnLst>
-  </p:timing>
-</p:sld>
-</file>
-
-<file path=ppt/slides/slide3.xml><?xml version="1.0" encoding="utf-8"?>
-<p:sld xmlns:a="http://schemas.openxmlformats.org/drawingml/2006/main" xmlns:r="http://schemas.openxmlformats.org/officeDocument/2006/relationships" xmlns:p="http://schemas.openxmlformats.org/presentationml/2006/main">
-  <p:cSld>
-    <p:spTree>
-      <p:nvGrpSpPr>
-        <p:cNvPr id="1" name=""/>
-        <p:cNvGrpSpPr/>
-        <p:nvPr/>
-      </p:nvGrpSpPr>
-      <p:grpSpPr>
-        <a:xfrm>
-          <a:off x="0" y="0"/>
-          <a:ext cx="0" cy="0"/>
-          <a:chOff x="0" y="0"/>
-          <a:chExt cx="0" cy="0"/>
-        </a:xfrm>
-      </p:grpSpPr>
-      <p:sp>
-        <p:nvSpPr>
-          <p:cNvPr id="2" name="Title 1"/>
-          <p:cNvSpPr>
-            <a:spLocks noGrp="1"/>
-          </p:cNvSpPr>
-          <p:nvPr>
-            <p:ph type="title"/>
-          </p:nvPr>
-        </p:nvSpPr>
-        <p:spPr/>
-        <p:txBody>
-          <a:bodyPr/>
-          <a:lstStyle/>
-          <a:p>
-            <a:r>
-              <a:rPr lang="en-US" u="sng" dirty="0" smtClean="0"/>
-              <a:t>Proposed Apps</a:t>
-            </a:r>
-            <a:endParaRPr lang="en-US" u="sng" dirty="0"/>
-          </a:p>
-        </p:txBody>
-      </p:sp>
-      <p:sp>
-        <p:nvSpPr>
-          <p:cNvPr id="3" name="Content Placeholder 2"/>
-          <p:cNvSpPr>
-            <a:spLocks noGrp="1"/>
-          </p:cNvSpPr>
-          <p:nvPr>
-            <p:ph idx="1"/>
-          </p:nvPr>
-        </p:nvSpPr>
-        <p:spPr/>
-        <p:txBody>
-          <a:bodyPr/>
-          <a:lstStyle/>
-          <a:p>
-            <a:pPr marL="514350" lvl="0" indent="-514350">
-              <a:buFont typeface="+mj-lt"/>
-              <a:buAutoNum type="arabicPeriod"/>
-            </a:pPr>
-            <a:r>
-              <a:rPr lang="en-US" dirty="0" err="1"/>
-              <a:t>AnTuTu</a:t>
-            </a:r>
-            <a:r>
-              <a:rPr lang="en-US" dirty="0"/>
-              <a:t> Benchmark</a:t>
-            </a:r>
-          </a:p>
-          <a:p>
-            <a:pPr marL="514350" lvl="0" indent="-514350">
-              <a:buFont typeface="+mj-lt"/>
-              <a:buAutoNum type="arabicPeriod"/>
-            </a:pPr>
-            <a:r>
-              <a:rPr lang="en-US" dirty="0" err="1"/>
-              <a:t>Vellamo</a:t>
-            </a:r>
-            <a:r>
-              <a:rPr lang="en-US" dirty="0"/>
-              <a:t> Mobile Web Benchmark</a:t>
-            </a:r>
-          </a:p>
-          <a:p>
-            <a:pPr marL="0" indent="0">
-              <a:buNone/>
-            </a:pPr>
-            <a:r>
-              <a:rPr lang="en-US" dirty="0" smtClean="0"/>
-              <a:t>3. </a:t>
-            </a:r>
-            <a:r>
-              <a:rPr lang="en-US" dirty="0" err="1" smtClean="0"/>
-              <a:t>GlBenchmark</a:t>
-            </a:r>
-            <a:r>
-              <a:rPr lang="en-US" dirty="0" smtClean="0"/>
-              <a:t> (for additional information)</a:t>
-            </a:r>
-            <a:endParaRPr lang="en-US" dirty="0"/>
-          </a:p>
-        </p:txBody>
-      </p:sp>
-    </p:spTree>
-    <p:extLst>
-      <p:ext uri="{BB962C8B-B14F-4D97-AF65-F5344CB8AC3E}">
-        <p14:creationId xmlns:p14="http://schemas.microsoft.com/office/powerpoint/2010/main" val="4259909232"/>
-      </p:ext>
-    </p:extLst>
-  </p:cSld>
-  <p:clrMapOvr>
-    <a:masterClrMapping/>
-  </p:clrMapOvr>
-  <p:timing>
-    <p:tnLst>
-      <p:par>
-        <p:cTn id="1" dur="indefinite" restart="never" nodeType="tmRoot"/>
-      </p:par>
-    </p:tnLst>
-  </p:timing>
-</p:sld>
-</file>
-
-<file path=ppt/slides/slide4.xml><?xml version="1.0" encoding="utf-8"?>
-<p:sld xmlns:a="http://schemas.openxmlformats.org/drawingml/2006/main" xmlns:r="http://schemas.openxmlformats.org/officeDocument/2006/relationships" xmlns:p="http://schemas.openxmlformats.org/presentationml/2006/main">
-  <p:cSld>
-    <p:spTree>
-      <p:nvGrpSpPr>
-        <p:cNvPr id="1" name=""/>
-        <p:cNvGrpSpPr/>
-        <p:nvPr/>
-      </p:nvGrpSpPr>
-      <p:grpSpPr>
-        <a:xfrm>
-          <a:off x="0" y="0"/>
-          <a:ext cx="0" cy="0"/>
-          <a:chOff x="0" y="0"/>
-          <a:chExt cx="0" cy="0"/>
-        </a:xfrm>
-      </p:grpSpPr>
-      <p:sp>
-        <p:nvSpPr>
-          <p:cNvPr id="2" name="Title 1"/>
-          <p:cNvSpPr>
-            <a:spLocks noGrp="1"/>
-          </p:cNvSpPr>
-          <p:nvPr>
-            <p:ph type="title"/>
-          </p:nvPr>
-        </p:nvSpPr>
-        <p:spPr/>
-        <p:txBody>
-          <a:bodyPr>
-            <a:normAutofit/>
-          </a:bodyPr>
-          <a:lstStyle/>
-          <a:p>
-            <a:pPr lvl="0"/>
-            <a:r>
-              <a:rPr lang="en-US" b="1" u="sng" dirty="0" err="1"/>
-              <a:t>AnTuTu</a:t>
-            </a:r>
-            <a:r>
-              <a:rPr lang="en-US" b="1" u="sng" dirty="0"/>
-              <a:t> Benchmark </a:t>
-            </a:r>
-            <a:endParaRPr lang="en-US" dirty="0"/>
-          </a:p>
-        </p:txBody>
-      </p:sp>
-      <p:sp>
-        <p:nvSpPr>
-          <p:cNvPr id="3" name="Content Placeholder 2"/>
-          <p:cNvSpPr>
-            <a:spLocks noGrp="1"/>
-          </p:cNvSpPr>
-          <p:nvPr>
-            <p:ph sz="half" idx="1"/>
-          </p:nvPr>
-        </p:nvSpPr>
-        <p:spPr>
-          <a:xfrm>
-            <a:off x="457200" y="1600200"/>
-            <a:ext cx="4038600" cy="4525963"/>
-          </a:xfrm>
-        </p:spPr>
-        <p:txBody>
-          <a:bodyPr>
-            <a:normAutofit/>
-          </a:bodyPr>
-          <a:lstStyle/>
-          <a:p>
-            <a:r>
-              <a:rPr lang="en-US" sz="2400" dirty="0" smtClean="0"/>
-              <a:t>Runs </a:t>
-            </a:r>
-            <a:r>
-              <a:rPr lang="en-US" sz="2400" dirty="0"/>
-              <a:t>tests on the following parts</a:t>
-            </a:r>
-          </a:p>
-          <a:p>
-            <a:pPr lvl="1"/>
-            <a:r>
-              <a:rPr lang="en-US" sz="2000" dirty="0"/>
-              <a:t>Memory Performance </a:t>
-            </a:r>
-          </a:p>
-          <a:p>
-            <a:pPr lvl="1"/>
-            <a:r>
-              <a:rPr lang="en-US" sz="2000" dirty="0"/>
-              <a:t>CPU Integer Performance</a:t>
-            </a:r>
-          </a:p>
-          <a:p>
-            <a:pPr lvl="1"/>
-            <a:r>
-              <a:rPr lang="en-US" sz="2000" dirty="0"/>
-              <a:t>CPU Floating point Performance</a:t>
-            </a:r>
-          </a:p>
-          <a:p>
-            <a:pPr lvl="1"/>
-            <a:r>
-              <a:rPr lang="en-US" sz="2000" dirty="0"/>
-              <a:t>2D Graphics Performance</a:t>
-            </a:r>
-          </a:p>
-          <a:p>
-            <a:pPr lvl="1"/>
-            <a:r>
-              <a:rPr lang="en-US" sz="2000" dirty="0"/>
-              <a:t>3D Graphics Performance</a:t>
-            </a:r>
-          </a:p>
-          <a:p>
-            <a:pPr lvl="1"/>
-            <a:r>
-              <a:rPr lang="en-US" sz="2000" dirty="0"/>
-              <a:t>SD card reading/writing speed</a:t>
-            </a:r>
-          </a:p>
-          <a:p>
-            <a:pPr lvl="1"/>
-            <a:r>
-              <a:rPr lang="en-US" sz="2000" dirty="0"/>
-              <a:t>Database IO performance </a:t>
-            </a:r>
-            <a:r>
-              <a:rPr lang="en-US" sz="2000" dirty="0" smtClean="0"/>
-              <a:t>testing</a:t>
-            </a:r>
-            <a:endParaRPr lang="en-US" sz="2000" dirty="0"/>
-          </a:p>
-        </p:txBody>
-      </p:sp>
-      <p:sp>
-        <p:nvSpPr>
-          <p:cNvPr id="5" name="Content Placeholder 4"/>
-          <p:cNvSpPr>
-            <a:spLocks noGrp="1"/>
-          </p:cNvSpPr>
-          <p:nvPr>
-            <p:ph sz="half" idx="2"/>
-          </p:nvPr>
-        </p:nvSpPr>
-        <p:spPr/>
-        <p:txBody>
-          <a:bodyPr>
-            <a:normAutofit/>
-          </a:bodyPr>
-          <a:lstStyle/>
-          <a:p>
-            <a:pPr marL="0" indent="0">
-              <a:buNone/>
-            </a:pPr>
-            <a:endParaRPr lang="en-US" dirty="0"/>
-          </a:p>
-        </p:txBody>
-      </p:sp>
-      <p:pic>
-        <p:nvPicPr>
-          <p:cNvPr id="4" name="Picture 3"/>
-          <p:cNvPicPr>
-            <a:picLocks noChangeAspect="1"/>
-          </p:cNvPicPr>
-          <p:nvPr/>
-        </p:nvPicPr>
-        <p:blipFill rotWithShape="1">
-          <a:blip r:embed="rId2">
-            <a:extLst>
-              <a:ext uri="{28A0092B-C50C-407E-A947-70E740481C1C}">
-                <a14:useLocalDpi xmlns:a14="http://schemas.microsoft.com/office/drawing/2010/main" val="0"/>
-              </a:ext>
-            </a:extLst>
-          </a:blip>
-          <a:srcRect t="4038"/>
-          <a:stretch/>
-        </p:blipFill>
-        <p:spPr>
-          <a:xfrm>
-            <a:off x="4648200" y="1960418"/>
-            <a:ext cx="2133600" cy="3338955"/>
-          </a:xfrm>
-          <a:prstGeom prst="rect">
-            <a:avLst/>
-          </a:prstGeom>
-        </p:spPr>
-      </p:pic>
-      <p:pic>
-        <p:nvPicPr>
-          <p:cNvPr id="6" name="Picture 5"/>
-          <p:cNvPicPr>
-            <a:picLocks noChangeAspect="1"/>
-          </p:cNvPicPr>
-          <p:nvPr/>
-        </p:nvPicPr>
-        <p:blipFill rotWithShape="1">
-          <a:blip r:embed="rId3">
-            <a:extLst>
-              <a:ext uri="{28A0092B-C50C-407E-A947-70E740481C1C}">
-                <a14:useLocalDpi xmlns:a14="http://schemas.microsoft.com/office/drawing/2010/main" val="0"/>
-              </a:ext>
-            </a:extLst>
-          </a:blip>
-          <a:srcRect t="4578" b="9804"/>
-          <a:stretch/>
-        </p:blipFill>
-        <p:spPr>
-          <a:xfrm>
-            <a:off x="6988869" y="1946562"/>
-            <a:ext cx="1926529" cy="3338956"/>
-          </a:xfrm>
-          <a:prstGeom prst="rect">
-            <a:avLst/>
-          </a:prstGeom>
-        </p:spPr>
-      </p:pic>
-      <p:pic>
-        <p:nvPicPr>
-          <p:cNvPr id="7" name="Picture 6"/>
-          <p:cNvPicPr>
-            <a:picLocks noChangeAspect="1"/>
-          </p:cNvPicPr>
-          <p:nvPr/>
-        </p:nvPicPr>
-        <p:blipFill>
-          <a:blip r:embed="rId4">
-            <a:extLst>
-              <a:ext uri="{28A0092B-C50C-407E-A947-70E740481C1C}">
-                <a14:useLocalDpi xmlns:a14="http://schemas.microsoft.com/office/drawing/2010/main" val="0"/>
-              </a:ext>
-            </a:extLst>
-          </a:blip>
-          <a:stretch>
-            <a:fillRect/>
-          </a:stretch>
-        </p:blipFill>
-        <p:spPr>
-          <a:xfrm>
-            <a:off x="7043437" y="533400"/>
-            <a:ext cx="742950" cy="742950"/>
-          </a:xfrm>
-          <a:prstGeom prst="rect">
-            <a:avLst/>
-          </a:prstGeom>
-        </p:spPr>
-      </p:pic>
-    </p:spTree>
-    <p:extLst>
-      <p:ext uri="{BB962C8B-B14F-4D97-AF65-F5344CB8AC3E}">
-        <p14:creationId xmlns:p14="http://schemas.microsoft.com/office/powerpoint/2010/main" val="2206322671"/>
-      </p:ext>
-    </p:extLst>
-  </p:cSld>
-  <p:clrMapOvr>
-    <a:masterClrMapping/>
-  </p:clrMapOvr>
-  <p:timing>
-    <p:tnLst>
-      <p:par>
-        <p:cTn id="1" dur="indefinite" restart="never" nodeType="tmRoot"/>
-      </p:par>
-    </p:tnLst>
-  </p:timing>
-</p:sld>
-</file>
-
-<file path=ppt/slides/slide5.xml><?xml version="1.0" encoding="utf-8"?>
-<p:sld xmlns:a="http://schemas.openxmlformats.org/drawingml/2006/main" xmlns:r="http://schemas.openxmlformats.org/officeDocument/2006/relationships" xmlns:p="http://schemas.openxmlformats.org/presentationml/2006/main">
-  <p:cSld>
-    <p:spTree>
-      <p:nvGrpSpPr>
-        <p:cNvPr id="1" name=""/>
-        <p:cNvGrpSpPr/>
-        <p:nvPr/>
-      </p:nvGrpSpPr>
-      <p:grpSpPr>
-        <a:xfrm>
-          <a:off x="0" y="0"/>
-          <a:ext cx="0" cy="0"/>
-          <a:chOff x="0" y="0"/>
-          <a:chExt cx="0" cy="0"/>
-        </a:xfrm>
-      </p:grpSpPr>
-      <p:sp>
-        <p:nvSpPr>
-          <p:cNvPr id="2" name="Title 1"/>
-          <p:cNvSpPr>
-            <a:spLocks noGrp="1"/>
-          </p:cNvSpPr>
-          <p:nvPr>
-            <p:ph type="title"/>
-          </p:nvPr>
-        </p:nvSpPr>
-        <p:spPr/>
-        <p:txBody>
-          <a:bodyPr/>
-          <a:lstStyle/>
-          <a:p>
-            <a:r>
-              <a:rPr lang="en-US" u="sng" dirty="0" smtClean="0"/>
-              <a:t>Quadrant Standard Edition</a:t>
-            </a:r>
-            <a:endParaRPr lang="en-US" u="sng" dirty="0"/>
-          </a:p>
-        </p:txBody>
-      </p:sp>
-      <p:sp>
-        <p:nvSpPr>
-          <p:cNvPr id="4" name="Content Placeholder 3"/>
-          <p:cNvSpPr>
-            <a:spLocks noGrp="1"/>
-          </p:cNvSpPr>
-          <p:nvPr>
-            <p:ph sz="half" idx="1"/>
-          </p:nvPr>
-        </p:nvSpPr>
-        <p:spPr/>
-        <p:txBody>
-          <a:bodyPr>
-            <a:normAutofit lnSpcReduction="10000"/>
-          </a:bodyPr>
-          <a:lstStyle/>
-          <a:p>
-            <a:r>
-              <a:rPr lang="en-US" sz="2600" dirty="0" smtClean="0"/>
-              <a:t>Runs </a:t>
-            </a:r>
-            <a:r>
-              <a:rPr lang="en-US" sz="2600" dirty="0"/>
-              <a:t>tests on the following parts</a:t>
-            </a:r>
-          </a:p>
-          <a:p>
-            <a:pPr lvl="1"/>
-            <a:r>
-              <a:rPr lang="en-US" sz="2200" dirty="0" smtClean="0"/>
-              <a:t>CPU </a:t>
-            </a:r>
-            <a:r>
-              <a:rPr lang="en-US" sz="2200" dirty="0"/>
-              <a:t>- arithmetic operations, XML parsing, multimedia decoding</a:t>
-            </a:r>
-          </a:p>
-          <a:p>
-            <a:pPr lvl="1"/>
-            <a:r>
-              <a:rPr lang="en-US" sz="2200" dirty="0"/>
-              <a:t>Memory throughput</a:t>
-            </a:r>
-          </a:p>
-          <a:p>
-            <a:pPr lvl="1"/>
-            <a:r>
-              <a:rPr lang="en-US" sz="2200" dirty="0"/>
-              <a:t>I/O - </a:t>
-            </a:r>
-            <a:r>
-              <a:rPr lang="en-US" sz="2200" dirty="0" err="1"/>
-              <a:t>filesystem</a:t>
-            </a:r>
-            <a:r>
-              <a:rPr lang="en-US" sz="2200" dirty="0"/>
-              <a:t> access and database operations</a:t>
-            </a:r>
-          </a:p>
-          <a:p>
-            <a:pPr lvl="1"/>
-            <a:r>
-              <a:rPr lang="en-US" sz="2200" dirty="0"/>
-              <a:t>2D graphics</a:t>
-            </a:r>
-          </a:p>
-          <a:p>
-            <a:pPr lvl="1"/>
-            <a:r>
-              <a:rPr lang="en-US" sz="2200" dirty="0"/>
-              <a:t>3D graphics - OpenGL single-pass and multi-pass rendering with stencil </a:t>
-            </a:r>
-            <a:r>
-              <a:rPr lang="en-US" sz="2200" dirty="0" smtClean="0"/>
-              <a:t>buffers</a:t>
-            </a:r>
-            <a:endParaRPr lang="en-US" sz="2200" dirty="0"/>
-          </a:p>
-        </p:txBody>
-      </p:sp>
-      <p:pic>
-        <p:nvPicPr>
-          <p:cNvPr id="3" name="Content Placeholder 2"/>
-          <p:cNvPicPr>
-            <a:picLocks noGrp="1" noChangeAspect="1"/>
-          </p:cNvPicPr>
-          <p:nvPr>
-            <p:ph sz="half" idx="2"/>
-          </p:nvPr>
-        </p:nvPicPr>
-        <p:blipFill>
-          <a:blip r:embed="rId2">
-            <a:extLst>
-              <a:ext uri="{28A0092B-C50C-407E-A947-70E740481C1C}">
-                <a14:useLocalDpi xmlns:a14="http://schemas.microsoft.com/office/drawing/2010/main" val="0"/>
-              </a:ext>
-            </a:extLst>
-          </a:blip>
-          <a:stretch>
-            <a:fillRect/>
-          </a:stretch>
-        </p:blipFill>
-        <p:spPr>
-          <a:xfrm>
-            <a:off x="4535728" y="2209800"/>
-            <a:ext cx="2052108" cy="3200400"/>
-          </a:xfrm>
-        </p:spPr>
-      </p:pic>
-      <p:pic>
-        <p:nvPicPr>
-          <p:cNvPr id="6" name="Picture 5"/>
-          <p:cNvPicPr>
-            <a:picLocks noChangeAspect="1"/>
-          </p:cNvPicPr>
-          <p:nvPr/>
-        </p:nvPicPr>
-        <p:blipFill>
-          <a:blip r:embed="rId3">
-            <a:extLst>
-              <a:ext uri="{28A0092B-C50C-407E-A947-70E740481C1C}">
-                <a14:useLocalDpi xmlns:a14="http://schemas.microsoft.com/office/drawing/2010/main" val="0"/>
-              </a:ext>
-            </a:extLst>
-          </a:blip>
-          <a:stretch>
-            <a:fillRect/>
-          </a:stretch>
-        </p:blipFill>
-        <p:spPr>
-          <a:xfrm>
-            <a:off x="6629400" y="2209800"/>
-            <a:ext cx="2133600" cy="3200400"/>
-          </a:xfrm>
-          <a:prstGeom prst="rect">
-            <a:avLst/>
-          </a:prstGeom>
-        </p:spPr>
-      </p:pic>
-    </p:spTree>
-    <p:extLst>
-      <p:ext uri="{BB962C8B-B14F-4D97-AF65-F5344CB8AC3E}">
-        <p14:creationId xmlns:p14="http://schemas.microsoft.com/office/powerpoint/2010/main" val="1804225097"/>
-      </p:ext>
-    </p:extLst>
-  </p:cSld>
-  <p:clrMapOvr>
-    <a:masterClrMapping/>
-  </p:clrMapOvr>
-  <p:timing>
-    <p:tnLst>
-      <p:par>
-        <p:cTn id="1" dur="indefinite" restart="never" nodeType="tmRoot"/>
-      </p:par>
-    </p:tnLst>
-  </p:timing>
-</p:sld>
-</file>
-
-<file path=ppt/slides/slide6.xml><?xml version="1.0" encoding="utf-8"?>
-<p:sld xmlns:a="http://schemas.openxmlformats.org/drawingml/2006/main" xmlns:r="http://schemas.openxmlformats.org/officeDocument/2006/relationships" xmlns:p="http://schemas.openxmlformats.org/presentationml/2006/main">
-  <p:cSld>
-    <p:spTree>
-      <p:nvGrpSpPr>
-        <p:cNvPr id="1" name=""/>
-        <p:cNvGrpSpPr/>
-        <p:nvPr/>
-      </p:nvGrpSpPr>
-      <p:grpSpPr>
-        <a:xfrm>
-          <a:off x="0" y="0"/>
-          <a:ext cx="0" cy="0"/>
-          <a:chOff x="0" y="0"/>
-          <a:chExt cx="0" cy="0"/>
-        </a:xfrm>
-      </p:grpSpPr>
-      <p:sp>
-        <p:nvSpPr>
-          <p:cNvPr id="2" name="Title 1"/>
-          <p:cNvSpPr>
-            <a:spLocks noGrp="1"/>
-          </p:cNvSpPr>
-          <p:nvPr>
-            <p:ph type="title"/>
-          </p:nvPr>
-        </p:nvSpPr>
-        <p:spPr/>
-        <p:txBody>
-          <a:bodyPr>
-            <a:normAutofit/>
-          </a:bodyPr>
-          <a:lstStyle/>
-          <a:p>
-            <a:r>
-              <a:rPr lang="en-US" sz="3200" b="1" u="sng" dirty="0" err="1" smtClean="0"/>
-              <a:t>AnTuTu</a:t>
-            </a:r>
-            <a:r>
-              <a:rPr lang="en-US" sz="3200" b="1" u="sng" dirty="0" smtClean="0"/>
-              <a:t> Benchmark  VS Quadrant</a:t>
-            </a:r>
-            <a:endParaRPr lang="en-US" sz="3200" dirty="0"/>
-          </a:p>
-        </p:txBody>
-      </p:sp>
-      <p:sp>
-        <p:nvSpPr>
-          <p:cNvPr id="3" name="Content Placeholder 2"/>
-          <p:cNvSpPr>
-            <a:spLocks noGrp="1"/>
-          </p:cNvSpPr>
-          <p:nvPr>
-            <p:ph idx="1"/>
-          </p:nvPr>
-        </p:nvSpPr>
-        <p:spPr/>
-        <p:txBody>
-          <a:bodyPr>
-            <a:normAutofit lnSpcReduction="10000"/>
-          </a:bodyPr>
-          <a:lstStyle/>
-          <a:p>
-            <a:r>
-              <a:rPr lang="en-US" sz="2400" dirty="0" smtClean="0"/>
-              <a:t>Quadrant is a popular android application similar to </a:t>
-            </a:r>
-            <a:r>
-              <a:rPr lang="en-US" sz="2400" dirty="0" err="1" smtClean="0"/>
-              <a:t>AnTuTu</a:t>
-            </a:r>
-            <a:r>
-              <a:rPr lang="en-US" sz="2400" dirty="0" smtClean="0"/>
-              <a:t> Benchmark, it also performs </a:t>
-            </a:r>
-            <a:r>
-              <a:rPr lang="en-US" sz="2400" dirty="0"/>
-              <a:t>tests on CPU, Memory, I/O and 2D and 3D graphics performance </a:t>
-            </a:r>
-          </a:p>
-          <a:p>
-            <a:pPr marL="0" indent="0">
-              <a:buNone/>
-            </a:pPr>
-            <a:endParaRPr lang="en-US" sz="2400" dirty="0" smtClean="0"/>
-          </a:p>
-          <a:p>
-            <a:r>
-              <a:rPr lang="en-US" sz="2400" dirty="0" err="1" smtClean="0"/>
-              <a:t>AnTuTu</a:t>
-            </a:r>
-            <a:r>
-              <a:rPr lang="en-US" sz="2400" dirty="0" smtClean="0"/>
-              <a:t> Benchmark allows both full benchmark test and custom benchmark test, that is user can choose to test on certain parts of the </a:t>
-            </a:r>
-            <a:r>
-              <a:rPr lang="en-US" sz="2400" dirty="0" smtClean="0"/>
-              <a:t>device. </a:t>
-            </a:r>
-          </a:p>
-          <a:p>
-            <a:endParaRPr lang="en-US" sz="2400" dirty="0" smtClean="0"/>
-          </a:p>
-          <a:p>
-            <a:r>
-              <a:rPr lang="en-US" sz="2400" dirty="0" smtClean="0"/>
-              <a:t>Quadrant  </a:t>
-            </a:r>
-            <a:r>
-              <a:rPr lang="en-US" sz="2400" dirty="0"/>
-              <a:t>Standard Edition only allows full benchmark test,   custom test is only </a:t>
-            </a:r>
-            <a:r>
-              <a:rPr lang="en-US" sz="2400" dirty="0" err="1" smtClean="0"/>
-              <a:t>avaiable</a:t>
-            </a:r>
-            <a:r>
-              <a:rPr lang="en-US" sz="2400" dirty="0" smtClean="0"/>
-              <a:t> in </a:t>
-            </a:r>
-            <a:r>
-              <a:rPr lang="en-US" sz="2400" dirty="0"/>
-              <a:t>the </a:t>
-            </a:r>
-            <a:r>
-              <a:rPr lang="en-US" sz="2400" dirty="0" smtClean="0"/>
-              <a:t>advanced edition</a:t>
-            </a:r>
-            <a:endParaRPr lang="en-US" sz="2400" dirty="0"/>
-          </a:p>
-          <a:p>
-            <a:pPr marL="0" indent="0">
-              <a:buNone/>
-            </a:pPr>
-            <a:endParaRPr lang="en-US" sz="2400" dirty="0"/>
-          </a:p>
-          <a:p>
-            <a:r>
-              <a:rPr lang="en-US" sz="2400" dirty="0" err="1"/>
-              <a:t>AnTuTu</a:t>
-            </a:r>
-            <a:r>
-              <a:rPr lang="en-US" sz="2400" dirty="0"/>
-              <a:t> can finish the full benchmark test within 5 </a:t>
-            </a:r>
-            <a:r>
-              <a:rPr lang="en-US" sz="2400" dirty="0" smtClean="0"/>
-              <a:t>minutes</a:t>
-            </a:r>
-          </a:p>
-        </p:txBody>
-      </p:sp>
-    </p:spTree>
-    <p:extLst>
-      <p:ext uri="{BB962C8B-B14F-4D97-AF65-F5344CB8AC3E}">
-        <p14:creationId xmlns:p14="http://schemas.microsoft.com/office/powerpoint/2010/main" val="1445709920"/>
-      </p:ext>
-    </p:extLst>
-  </p:cSld>
-  <p:clrMapOvr>
-    <a:masterClrMapping/>
-  </p:clrMapOvr>
-  <p:timing>
-    <p:tnLst>
-      <p:par>
-        <p:cTn id="1" dur="indefinite" restart="never" nodeType="tmRoot"/>
-      </p:par>
-    </p:tnLst>
-  </p:timing>
-</p:sld>
-</file>
-
-<file path=ppt/slides/slide7.xml><?xml version="1.0" encoding="utf-8"?>
-<p:sld xmlns:a="http://schemas.openxmlformats.org/drawingml/2006/main" xmlns:r="http://schemas.openxmlformats.org/officeDocument/2006/relationships" xmlns:p="http://schemas.openxmlformats.org/presentationml/2006/main">
-  <p:cSld>
-    <p:spTree>
-      <p:nvGrpSpPr>
-        <p:cNvPr id="1" name=""/>
-        <p:cNvGrpSpPr/>
-        <p:nvPr/>
-      </p:nvGrpSpPr>
-      <p:grpSpPr>
-        <a:xfrm>
-          <a:off x="0" y="0"/>
-          <a:ext cx="0" cy="0"/>
-          <a:chOff x="0" y="0"/>
-          <a:chExt cx="0" cy="0"/>
-        </a:xfrm>
-      </p:grpSpPr>
-      <p:sp>
-        <p:nvSpPr>
-          <p:cNvPr id="2" name="Title 1"/>
-          <p:cNvSpPr>
-            <a:spLocks noGrp="1"/>
-          </p:cNvSpPr>
-          <p:nvPr>
-            <p:ph type="title"/>
-          </p:nvPr>
-        </p:nvSpPr>
-        <p:spPr>
-          <a:xfrm>
-            <a:off x="152400" y="152400"/>
-            <a:ext cx="8229600" cy="1143000"/>
-          </a:xfrm>
-        </p:spPr>
-        <p:txBody>
-          <a:bodyPr>
-            <a:normAutofit/>
-          </a:bodyPr>
-          <a:lstStyle/>
-          <a:p>
-            <a:pPr lvl="0"/>
-            <a:r>
-              <a:rPr lang="en-US" b="1" u="sng" dirty="0" err="1"/>
-              <a:t>Vellamo</a:t>
-            </a:r>
-            <a:r>
-              <a:rPr lang="en-US" b="1" u="sng" dirty="0"/>
-              <a:t> Mobile Web </a:t>
-            </a:r>
-            <a:r>
-              <a:rPr lang="en-US" b="1" u="sng" dirty="0" smtClean="0"/>
-              <a:t>Benchmark</a:t>
-            </a:r>
-            <a:endParaRPr lang="en-US" dirty="0"/>
-          </a:p>
-        </p:txBody>
-      </p:sp>
-      <p:sp>
-        <p:nvSpPr>
-          <p:cNvPr id="3" name="Content Placeholder 2"/>
-          <p:cNvSpPr>
-            <a:spLocks noGrp="1"/>
-          </p:cNvSpPr>
-          <p:nvPr>
-            <p:ph idx="1"/>
-          </p:nvPr>
-        </p:nvSpPr>
-        <p:spPr>
-          <a:xfrm>
-            <a:off x="457200" y="1200150"/>
-            <a:ext cx="5334000" cy="5257800"/>
-          </a:xfrm>
-        </p:spPr>
-        <p:txBody>
-          <a:bodyPr>
-            <a:normAutofit lnSpcReduction="10000"/>
-          </a:bodyPr>
-          <a:lstStyle/>
-          <a:p>
-            <a:r>
-              <a:rPr lang="en-US" sz="2000" dirty="0"/>
-              <a:t>Measures </a:t>
-            </a:r>
-            <a:r>
-              <a:rPr lang="en-US" sz="2000" dirty="0"/>
-              <a:t>the following things</a:t>
-            </a:r>
-          </a:p>
-          <a:p>
-            <a:pPr lvl="1"/>
-            <a:r>
-              <a:rPr lang="en-US" sz="1600" dirty="0"/>
-              <a:t>the browser’s use of the HTML5 display processing subsystem</a:t>
-            </a:r>
-          </a:p>
-          <a:p>
-            <a:pPr lvl="1"/>
-            <a:r>
-              <a:rPr lang="en-US" sz="1600" dirty="0"/>
-              <a:t>overall speed and efficiency of the JavaScript virtual machine</a:t>
-            </a:r>
-          </a:p>
-          <a:p>
-            <a:pPr lvl="1"/>
-            <a:r>
-              <a:rPr lang="en-US" sz="1600" dirty="0"/>
-              <a:t>the efficiency between this engine and the core browser</a:t>
-            </a:r>
-          </a:p>
-          <a:p>
-            <a:pPr lvl="1"/>
-            <a:r>
-              <a:rPr lang="en-US" sz="1600" dirty="0"/>
-              <a:t>responsiveness of panning, zooming, and scrolling of text, images, and standard web page objects</a:t>
-            </a:r>
-          </a:p>
-          <a:p>
-            <a:pPr lvl="1"/>
-            <a:r>
-              <a:rPr lang="en-US" sz="1600" dirty="0"/>
-              <a:t>the performance of the browser’s HTTP and IP networking </a:t>
-            </a:r>
-            <a:r>
-              <a:rPr lang="en-US" sz="1600" dirty="0" smtClean="0"/>
-              <a:t>stack</a:t>
-            </a:r>
-          </a:p>
-          <a:p>
-            <a:pPr marL="342900" lvl="1" indent="-342900">
-              <a:buFont typeface="Arial" pitchFamily="34" charset="0"/>
-              <a:buChar char="•"/>
-            </a:pPr>
-            <a:r>
-              <a:rPr lang="en-US" sz="2000" dirty="0"/>
-              <a:t>Can be used to benchmark different android device if the same browser is being used on </a:t>
-            </a:r>
-            <a:r>
-              <a:rPr lang="en-US" sz="2000" dirty="0" smtClean="0"/>
-              <a:t>each</a:t>
-            </a:r>
-            <a:endParaRPr lang="en-US" sz="1800" dirty="0" smtClean="0"/>
-          </a:p>
-          <a:p>
-            <a:pPr marL="342900" lvl="1" indent="-342900">
-              <a:buFont typeface="Arial" pitchFamily="34" charset="0"/>
-              <a:buChar char="•"/>
-            </a:pPr>
-            <a:r>
-              <a:rPr lang="en-US" sz="2000" dirty="0"/>
-              <a:t>Reasons for choosing this </a:t>
-            </a:r>
-            <a:r>
-              <a:rPr lang="en-US" sz="2000" dirty="0" smtClean="0"/>
-              <a:t>application instead of other browser benchmark:</a:t>
-            </a:r>
-            <a:endParaRPr lang="en-US" sz="2000" dirty="0"/>
-          </a:p>
-          <a:p>
-            <a:pPr lvl="1"/>
-            <a:r>
-              <a:rPr lang="en-US" sz="1600" dirty="0"/>
-              <a:t>High user rating </a:t>
-            </a:r>
-            <a:r>
-              <a:rPr lang="en-US" sz="1600" dirty="0" smtClean="0"/>
-              <a:t>in </a:t>
-            </a:r>
-            <a:r>
-              <a:rPr lang="en-US" sz="1600" dirty="0" err="1" smtClean="0"/>
-              <a:t>google</a:t>
-            </a:r>
-            <a:r>
-              <a:rPr lang="en-US" sz="1600" dirty="0" smtClean="0"/>
-              <a:t> </a:t>
-            </a:r>
-            <a:r>
-              <a:rPr lang="en-US" sz="1600" dirty="0"/>
-              <a:t>play </a:t>
-            </a:r>
-            <a:r>
-              <a:rPr lang="en-US" sz="1600" dirty="0" smtClean="0"/>
-              <a:t>store </a:t>
-            </a:r>
-          </a:p>
-          <a:p>
-            <a:pPr marL="400050" lvl="1" indent="0">
-              <a:buNone/>
-            </a:pPr>
-            <a:r>
-              <a:rPr lang="en-US" sz="1600" dirty="0"/>
-              <a:t> </a:t>
-            </a:r>
-            <a:r>
-              <a:rPr lang="en-US" sz="1200" dirty="0" smtClean="0"/>
-              <a:t>      (average rating : 4.3 / 5)</a:t>
-            </a:r>
-          </a:p>
-        </p:txBody>
-      </p:sp>
-      <p:pic>
-        <p:nvPicPr>
-          <p:cNvPr id="4" name="Picture 3"/>
-          <p:cNvPicPr>
-            <a:picLocks noChangeAspect="1"/>
-          </p:cNvPicPr>
-          <p:nvPr/>
-        </p:nvPicPr>
-        <p:blipFill>
-          <a:blip r:embed="rId3">
-            <a:extLst>
-              <a:ext uri="{28A0092B-C50C-407E-A947-70E740481C1C}">
-                <a14:useLocalDpi xmlns:a14="http://schemas.microsoft.com/office/drawing/2010/main" val="0"/>
-              </a:ext>
-            </a:extLst>
-          </a:blip>
-          <a:stretch>
-            <a:fillRect/>
-          </a:stretch>
-        </p:blipFill>
-        <p:spPr>
-          <a:xfrm>
-            <a:off x="5943600" y="1447800"/>
-            <a:ext cx="2924175" cy="4876800"/>
-          </a:xfrm>
-          <a:prstGeom prst="rect">
-            <a:avLst/>
-          </a:prstGeom>
-        </p:spPr>
-      </p:pic>
-      <p:pic>
-        <p:nvPicPr>
-          <p:cNvPr id="5" name="Picture 4"/>
-          <p:cNvPicPr>
-            <a:picLocks noChangeAspect="1"/>
-          </p:cNvPicPr>
-          <p:nvPr/>
-        </p:nvPicPr>
-        <p:blipFill>
-          <a:blip r:embed="rId4">
-            <a:extLst>
-              <a:ext uri="{28A0092B-C50C-407E-A947-70E740481C1C}">
-                <a14:useLocalDpi xmlns:a14="http://schemas.microsoft.com/office/drawing/2010/main" val="0"/>
-              </a:ext>
-            </a:extLst>
-          </a:blip>
-          <a:stretch>
-            <a:fillRect/>
-          </a:stretch>
-        </p:blipFill>
-        <p:spPr>
-          <a:xfrm>
-            <a:off x="7497907" y="371475"/>
-            <a:ext cx="742950" cy="742950"/>
-          </a:xfrm>
-          <a:prstGeom prst="rect">
-            <a:avLst/>
-          </a:prstGeom>
-        </p:spPr>
-      </p:pic>
-    </p:spTree>
-    <p:extLst>
-      <p:ext uri="{BB962C8B-B14F-4D97-AF65-F5344CB8AC3E}">
-        <p14:creationId xmlns:p14="http://schemas.microsoft.com/office/powerpoint/2010/main" val="685361917"/>
-      </p:ext>
-    </p:extLst>
-  </p:cSld>
-  <p:clrMapOvr>
-    <a:masterClrMapping/>
-  </p:clrMapOvr>
-  <p:timing>
-    <p:tnLst>
-      <p:par>
-        <p:cTn id="1" dur="indefinite" restart="never" nodeType="tmRoot"/>
-      </p:par>
-    </p:tnLst>
-  </p:timing>
-</p:sld>
-</file>
-
-<file path=ppt/slides/slide8.xml><?xml version="1.0" encoding="utf-8"?>
-<p:sld xmlns:a="http://schemas.openxmlformats.org/drawingml/2006/main" xmlns:r="http://schemas.openxmlformats.org/officeDocument/2006/relationships" xmlns:p="http://schemas.openxmlformats.org/presentationml/2006/main">
-  <p:cSld>
-    <p:spTree>
-      <p:nvGrpSpPr>
-        <p:cNvPr id="1" name=""/>
-        <p:cNvGrpSpPr/>
-        <p:nvPr/>
-      </p:nvGrpSpPr>
-      <p:grpSpPr>
-        <a:xfrm>
-          <a:off x="0" y="0"/>
-          <a:ext cx="0" cy="0"/>
-          <a:chOff x="0" y="0"/>
-          <a:chExt cx="0" cy="0"/>
-        </a:xfrm>
-      </p:grpSpPr>
-      <p:sp>
-        <p:nvSpPr>
-          <p:cNvPr id="2" name="Title 1"/>
-          <p:cNvSpPr>
-            <a:spLocks noGrp="1"/>
-          </p:cNvSpPr>
-          <p:nvPr>
-            <p:ph type="title"/>
-          </p:nvPr>
-        </p:nvSpPr>
-        <p:spPr/>
-        <p:txBody>
-          <a:bodyPr/>
-          <a:lstStyle/>
-          <a:p>
-            <a:r>
-              <a:rPr lang="en-US" b="1" u="sng" dirty="0" err="1" smtClean="0"/>
-              <a:t>GlBenchmark</a:t>
-            </a:r>
-            <a:endParaRPr lang="en-US" dirty="0"/>
-          </a:p>
-        </p:txBody>
-      </p:sp>
-      <p:sp>
-        <p:nvSpPr>
-          <p:cNvPr id="4" name="Content Placeholder 3"/>
-          <p:cNvSpPr>
-            <a:spLocks noGrp="1"/>
-          </p:cNvSpPr>
-          <p:nvPr>
-            <p:ph sz="half" idx="1"/>
-          </p:nvPr>
-        </p:nvSpPr>
-        <p:spPr/>
-        <p:txBody>
-          <a:bodyPr>
-            <a:normAutofit fontScale="92500"/>
-          </a:bodyPr>
-          <a:lstStyle/>
-          <a:p>
-            <a:r>
-              <a:rPr lang="en-US" dirty="0"/>
-              <a:t>gives more accurate 3D Graphics Performance measurement, it contains testing with high level 3D animation</a:t>
-            </a:r>
-            <a:r>
-              <a:rPr lang="en-US" dirty="0" smtClean="0"/>
-              <a:t>.</a:t>
-            </a:r>
-            <a:endParaRPr lang="en-US" dirty="0"/>
-          </a:p>
-          <a:p>
-            <a:r>
-              <a:rPr lang="en-US" dirty="0" smtClean="0"/>
-              <a:t>Reasons for choosing this application:</a:t>
-            </a:r>
-          </a:p>
-          <a:p>
-            <a:pPr lvl="1"/>
-            <a:r>
-              <a:rPr lang="en-US" dirty="0"/>
-              <a:t>Contains many </a:t>
-            </a:r>
-            <a:r>
-              <a:rPr lang="en-US" dirty="0" smtClean="0"/>
-              <a:t>different</a:t>
-            </a:r>
-            <a:r>
-              <a:rPr lang="en-US" baseline="0" dirty="0" smtClean="0"/>
-              <a:t> </a:t>
-            </a:r>
-            <a:r>
-              <a:rPr lang="en-US" dirty="0" smtClean="0"/>
-              <a:t>performance </a:t>
-            </a:r>
-            <a:r>
-              <a:rPr lang="en-US" dirty="0"/>
-              <a:t>tests on </a:t>
-            </a:r>
-            <a:r>
-              <a:rPr lang="en-US" dirty="0" smtClean="0"/>
-              <a:t>graphic  </a:t>
-            </a:r>
-            <a:r>
-              <a:rPr lang="en-US" dirty="0"/>
-              <a:t>(33 different tests)</a:t>
-            </a:r>
-          </a:p>
-          <a:p>
-            <a:pPr lvl="1"/>
-            <a:r>
-              <a:rPr lang="en-US" dirty="0"/>
-              <a:t>Flexible selection of </a:t>
-            </a:r>
-            <a:r>
-              <a:rPr lang="en-US" dirty="0" smtClean="0"/>
-              <a:t>test</a:t>
-            </a:r>
-            <a:endParaRPr lang="en-US" dirty="0"/>
-          </a:p>
-        </p:txBody>
-      </p:sp>
-      <p:sp>
-        <p:nvSpPr>
-          <p:cNvPr id="5" name="Content Placeholder 4"/>
-          <p:cNvSpPr>
-            <a:spLocks noGrp="1"/>
-          </p:cNvSpPr>
-          <p:nvPr>
-            <p:ph sz="half" idx="2"/>
-          </p:nvPr>
-        </p:nvSpPr>
-        <p:spPr/>
-        <p:txBody>
-          <a:bodyPr>
-            <a:normAutofit fontScale="92500"/>
-          </a:bodyPr>
-          <a:lstStyle/>
-          <a:p>
-            <a:endParaRPr lang="en-US" dirty="0"/>
-          </a:p>
-        </p:txBody>
-      </p:sp>
-      <p:pic>
-        <p:nvPicPr>
-          <p:cNvPr id="6" name="Picture 5"/>
-          <p:cNvPicPr>
-            <a:picLocks noChangeAspect="1"/>
-          </p:cNvPicPr>
-          <p:nvPr/>
-        </p:nvPicPr>
-        <p:blipFill>
-          <a:blip r:embed="rId2">
-            <a:extLst>
-              <a:ext uri="{28A0092B-C50C-407E-A947-70E740481C1C}">
-                <a14:useLocalDpi xmlns:a14="http://schemas.microsoft.com/office/drawing/2010/main" val="0"/>
-              </a:ext>
-            </a:extLst>
-          </a:blip>
-          <a:stretch>
-            <a:fillRect/>
-          </a:stretch>
-        </p:blipFill>
-        <p:spPr>
-          <a:xfrm>
-            <a:off x="6410325" y="533400"/>
-            <a:ext cx="742950" cy="742950"/>
-          </a:xfrm>
-          <a:prstGeom prst="rect">
-            <a:avLst/>
-          </a:prstGeom>
-        </p:spPr>
-      </p:pic>
-      <p:pic>
-        <p:nvPicPr>
-          <p:cNvPr id="10" name="Picture 9"/>
-          <p:cNvPicPr>
-            <a:picLocks noChangeAspect="1"/>
-          </p:cNvPicPr>
-          <p:nvPr/>
-        </p:nvPicPr>
-        <p:blipFill>
-          <a:blip r:embed="rId3">
-            <a:extLst>
-              <a:ext uri="{28A0092B-C50C-407E-A947-70E740481C1C}">
-                <a14:useLocalDpi xmlns:a14="http://schemas.microsoft.com/office/drawing/2010/main" val="0"/>
-              </a:ext>
-            </a:extLst>
-          </a:blip>
-          <a:stretch>
-            <a:fillRect/>
-          </a:stretch>
-        </p:blipFill>
-        <p:spPr>
-          <a:xfrm>
-            <a:off x="4479050" y="2093348"/>
-            <a:ext cx="2113172" cy="3338518"/>
-          </a:xfrm>
-          <a:prstGeom prst="rect">
-            <a:avLst/>
-          </a:prstGeom>
-        </p:spPr>
-      </p:pic>
-      <p:pic>
-        <p:nvPicPr>
-          <p:cNvPr id="11" name="Picture 10"/>
-          <p:cNvPicPr>
-            <a:picLocks noChangeAspect="1"/>
-          </p:cNvPicPr>
-          <p:nvPr/>
-        </p:nvPicPr>
-        <p:blipFill>
-          <a:blip r:embed="rId4">
-            <a:extLst>
-              <a:ext uri="{28A0092B-C50C-407E-A947-70E740481C1C}">
-                <a14:useLocalDpi xmlns:a14="http://schemas.microsoft.com/office/drawing/2010/main" val="0"/>
-              </a:ext>
-            </a:extLst>
-          </a:blip>
-          <a:stretch>
-            <a:fillRect/>
-          </a:stretch>
-        </p:blipFill>
-        <p:spPr>
-          <a:xfrm>
-            <a:off x="6781799" y="2093347"/>
-            <a:ext cx="2057401" cy="3338519"/>
-          </a:xfrm>
-          <a:prstGeom prst="rect">
-            <a:avLst/>
-          </a:prstGeom>
-        </p:spPr>
-      </p:pic>
-    </p:spTree>
-    <p:extLst>
-      <p:ext uri="{BB962C8B-B14F-4D97-AF65-F5344CB8AC3E}">
-        <p14:creationId xmlns:p14="http://schemas.microsoft.com/office/powerpoint/2010/main" val="14829009"/>
-      </p:ext>
-    </p:extLst>
-  </p:cSld>
-  <p:clrMapOvr>
-    <a:masterClrMapping/>
-  </p:clrMapOvr>
-  <p:timing>
-    <p:tnLst>
-      <p:par>
-        <p:cTn id="1" dur="indefinite" restart="never" nodeType="tmRoot"/>
-      </p:par>
-    </p:tnLst>
-  </p:timing>
-</p:sld>
-</file>
-
-<file path=ppt/slides/slide9.xml><?xml version="1.0" encoding="utf-8"?>
-<p:sld xmlns:a="http://schemas.openxmlformats.org/drawingml/2006/main" xmlns:r="http://schemas.openxmlformats.org/officeDocument/2006/relationships" xmlns:p="http://schemas.openxmlformats.org/presentationml/2006/main">
-  <p:cSld>
-    <p:spTree>
-      <p:nvGrpSpPr>
-        <p:cNvPr id="1" name=""/>
-        <p:cNvGrpSpPr/>
-        <p:nvPr/>
-      </p:nvGrpSpPr>
-      <p:grpSpPr>
-        <a:xfrm>
-          <a:off x="0" y="0"/>
-          <a:ext cx="0" cy="0"/>
-          <a:chOff x="0" y="0"/>
-          <a:chExt cx="0" cy="0"/>
-        </a:xfrm>
-      </p:grpSpPr>
-      <p:sp>
-        <p:nvSpPr>
-          <p:cNvPr id="2" name="Title 1"/>
-          <p:cNvSpPr>
-            <a:spLocks noGrp="1"/>
-          </p:cNvSpPr>
-          <p:nvPr>
-            <p:ph type="title"/>
-          </p:nvPr>
-        </p:nvSpPr>
-        <p:spPr/>
-        <p:txBody>
-          <a:bodyPr/>
-          <a:lstStyle/>
-          <a:p>
-            <a:pPr marL="0" marR="0" indent="0" algn="ctr" defTabSz="914400" rtl="0" eaLnBrk="1" fontAlgn="auto" latinLnBrk="0" hangingPunct="1">
-              <a:lnSpc>
-                <a:spcPct val="100000"/>
-              </a:lnSpc>
-              <a:spcBef>
-                <a:spcPct val="0"/>
-              </a:spcBef>
-              <a:spcAft>
-                <a:spcPts val="0"/>
-              </a:spcAft>
-              <a:buClrTx/>
-              <a:buSzTx/>
-              <a:buFontTx/>
-              <a:buNone/>
-              <a:tabLst/>
-              <a:defRPr/>
-            </a:pPr>
-            <a:r>
-              <a:rPr lang="en-US" sz="3600" u="sng" kern="1200" dirty="0" smtClean="0">
-                <a:solidFill>
-                  <a:schemeClr val="tx1"/>
-                </a:solidFill>
-                <a:effectLst/>
-              </a:rPr>
-              <a:t>SD Tool </a:t>
-            </a:r>
-            <a:endParaRPr lang="en-US" u="sng" dirty="0"/>
-          </a:p>
-        </p:txBody>
-      </p:sp>
-      <p:sp>
-        <p:nvSpPr>
-          <p:cNvPr id="3" name="Content Placeholder 2"/>
-          <p:cNvSpPr>
-            <a:spLocks noGrp="1"/>
-          </p:cNvSpPr>
-          <p:nvPr>
-            <p:ph sz="half" idx="1"/>
-          </p:nvPr>
-        </p:nvSpPr>
-        <p:spPr/>
-        <p:txBody>
-          <a:bodyPr>
-            <a:normAutofit/>
-          </a:bodyPr>
-          <a:lstStyle/>
-          <a:p>
-            <a:r>
-              <a:rPr lang="en-US" dirty="0"/>
-              <a:t>benchmark </a:t>
-            </a:r>
-            <a:r>
-              <a:rPr lang="en-US" dirty="0" smtClean="0"/>
-              <a:t>SD </a:t>
-            </a:r>
-            <a:r>
-              <a:rPr lang="en-US" dirty="0"/>
-              <a:t>card writing and reading </a:t>
-            </a:r>
-            <a:r>
-              <a:rPr lang="en-US" dirty="0" smtClean="0"/>
-              <a:t>speeds</a:t>
-            </a:r>
-            <a:endParaRPr lang="en-US" dirty="0"/>
-          </a:p>
-          <a:p>
-            <a:r>
-              <a:rPr lang="en-US" dirty="0" smtClean="0"/>
-              <a:t>Reason for not choosing:</a:t>
-            </a:r>
-          </a:p>
-          <a:p>
-            <a:pPr lvl="1"/>
-            <a:r>
-              <a:rPr lang="en-US" dirty="0" smtClean="0"/>
-              <a:t>Tests on SD writing and reading are already included in the testing done by </a:t>
-            </a:r>
-            <a:r>
-              <a:rPr lang="en-US" dirty="0" err="1" smtClean="0"/>
-              <a:t>AnTuTu</a:t>
-            </a:r>
-            <a:r>
-              <a:rPr lang="en-US" dirty="0" smtClean="0"/>
-              <a:t> </a:t>
-            </a:r>
-            <a:r>
-              <a:rPr lang="en-US" dirty="0" smtClean="0"/>
-              <a:t>Benchmark </a:t>
-            </a:r>
-            <a:endParaRPr lang="en-US" dirty="0"/>
-          </a:p>
-        </p:txBody>
-      </p:sp>
-      <p:pic>
-        <p:nvPicPr>
-          <p:cNvPr id="4" name="Content Placeholder 3"/>
-          <p:cNvPicPr>
-            <a:picLocks noGrp="1" noChangeAspect="1"/>
-          </p:cNvPicPr>
-          <p:nvPr>
-            <p:ph sz="half" idx="2"/>
-          </p:nvPr>
-        </p:nvPicPr>
-        <p:blipFill>
-          <a:blip r:embed="rId2">
-            <a:extLst>
-              <a:ext uri="{28A0092B-C50C-407E-A947-70E740481C1C}">
-                <a14:useLocalDpi xmlns:a14="http://schemas.microsoft.com/office/drawing/2010/main" val="0"/>
-              </a:ext>
-            </a:extLst>
-          </a:blip>
-          <a:stretch>
-            <a:fillRect/>
-          </a:stretch>
-        </p:blipFill>
-        <p:spPr>
-          <a:xfrm>
-            <a:off x="4419600" y="1600200"/>
-            <a:ext cx="2234781" cy="3715472"/>
-          </a:xfrm>
-        </p:spPr>
-      </p:pic>
-      <p:pic>
-        <p:nvPicPr>
-          <p:cNvPr id="6" name="Picture 5"/>
-          <p:cNvPicPr>
-            <a:picLocks noChangeAspect="1"/>
-          </p:cNvPicPr>
-          <p:nvPr/>
-        </p:nvPicPr>
-        <p:blipFill>
-          <a:blip r:embed="rId3">
-            <a:extLst>
-              <a:ext uri="{28A0092B-C50C-407E-A947-70E740481C1C}">
-                <a14:useLocalDpi xmlns:a14="http://schemas.microsoft.com/office/drawing/2010/main" val="0"/>
-              </a:ext>
-            </a:extLst>
-          </a:blip>
-          <a:stretch>
-            <a:fillRect/>
-          </a:stretch>
-        </p:blipFill>
-        <p:spPr>
-          <a:xfrm>
-            <a:off x="5562600" y="457200"/>
-            <a:ext cx="742950" cy="742950"/>
-          </a:xfrm>
-          <a:prstGeom prst="rect">
-            <a:avLst/>
-          </a:prstGeom>
-        </p:spPr>
-      </p:pic>
-      <p:pic>
-        <p:nvPicPr>
-          <p:cNvPr id="5" name="Picture 4"/>
-          <p:cNvPicPr>
-            <a:picLocks noChangeAspect="1"/>
-          </p:cNvPicPr>
-          <p:nvPr/>
-        </p:nvPicPr>
-        <p:blipFill>
-          <a:blip r:embed="rId4">
-            <a:extLst>
-              <a:ext uri="{28A0092B-C50C-407E-A947-70E740481C1C}">
-                <a14:useLocalDpi xmlns:a14="http://schemas.microsoft.com/office/drawing/2010/main" val="0"/>
-              </a:ext>
-            </a:extLst>
-          </a:blip>
-          <a:stretch>
-            <a:fillRect/>
-          </a:stretch>
-        </p:blipFill>
-        <p:spPr>
-          <a:xfrm>
-            <a:off x="6781800" y="1600200"/>
-            <a:ext cx="2209800" cy="3683000"/>
-          </a:xfrm>
-          <a:prstGeom prst="rect">
-            <a:avLst/>
-          </a:prstGeom>
-        </p:spPr>
-      </p:pic>
-    </p:spTree>
-    <p:extLst>
-      <p:ext uri="{BB962C8B-B14F-4D97-AF65-F5344CB8AC3E}">
-        <p14:creationId xmlns:p14="http://schemas.microsoft.com/office/powerpoint/2010/main" val="2211510816"/>
       </p:ext>
     </p:extLst>
   </p:cSld>

</xml_diff>